<commit_message>
added screenshots to deliverable 3 powerpoint
</commit_message>
<xml_diff>
--- a/Team Deliverable 3/Progress Report - FHIRed Up.pptx
+++ b/Team Deliverable 3/Progress Report - FHIRed Up.pptx
@@ -5,21 +5,20 @@
     <p:sldMasterId id="2147483684" r:id="rId1"/>
   </p:sldMasterIdLst>
   <p:notesMasterIdLst>
-    <p:notesMasterId r:id="rId14"/>
+    <p:notesMasterId r:id="rId13"/>
   </p:notesMasterIdLst>
   <p:sldIdLst>
     <p:sldId id="256" r:id="rId2"/>
     <p:sldId id="278" r:id="rId3"/>
-    <p:sldId id="279" r:id="rId4"/>
-    <p:sldId id="280" r:id="rId5"/>
-    <p:sldId id="281" r:id="rId6"/>
-    <p:sldId id="283" r:id="rId7"/>
-    <p:sldId id="284" r:id="rId8"/>
-    <p:sldId id="285" r:id="rId9"/>
-    <p:sldId id="282" r:id="rId10"/>
-    <p:sldId id="276" r:id="rId11"/>
-    <p:sldId id="277" r:id="rId12"/>
-    <p:sldId id="262" r:id="rId13"/>
+    <p:sldId id="280" r:id="rId4"/>
+    <p:sldId id="281" r:id="rId5"/>
+    <p:sldId id="283" r:id="rId6"/>
+    <p:sldId id="284" r:id="rId7"/>
+    <p:sldId id="285" r:id="rId8"/>
+    <p:sldId id="282" r:id="rId9"/>
+    <p:sldId id="276" r:id="rId10"/>
+    <p:sldId id="277" r:id="rId11"/>
+    <p:sldId id="262" r:id="rId12"/>
   </p:sldIdLst>
   <p:sldSz cx="9144000" cy="5715000" type="screen16x10"/>
   <p:notesSz cx="6858000" cy="9144000"/>
@@ -120,7 +119,7 @@
   </p:defaultTextStyle>
   <p:extLst>
     <p:ext uri="{EFAFB233-063F-42B5-8137-9DF3F51BA10A}">
-      <p15:sldGuideLst xmlns="" xmlns:p15="http://schemas.microsoft.com/office/powerpoint/2012/main">
+      <p15:sldGuideLst xmlns:p15="http://schemas.microsoft.com/office/powerpoint/2012/main">
         <p15:guide id="1" orient="horz" pos="1800" userDrawn="1">
           <p15:clr>
             <a:srgbClr val="A4A3A4"/>
@@ -134,7 +133,7 @@
       </p15:sldGuideLst>
     </p:ext>
     <p:ext uri="{2D200454-40CA-4A62-9FC3-DE9A4176ACB9}">
-      <p15:notesGuideLst xmlns="" xmlns:p15="http://schemas.microsoft.com/office/powerpoint/2012/main"/>
+      <p15:notesGuideLst xmlns:p15="http://schemas.microsoft.com/office/powerpoint/2012/main"/>
     </p:ext>
   </p:extLst>
 </p:presentation>
@@ -147,7 +146,7 @@
 </file>
 
 <file path=ppt/charts/chart1.xml><?xml version="1.0" encoding="utf-8"?>
-<c:chartSpace xmlns:c="http://schemas.openxmlformats.org/drawingml/2006/chart" xmlns:a="http://schemas.openxmlformats.org/drawingml/2006/main" xmlns:r="http://schemas.openxmlformats.org/officeDocument/2006/relationships">
+<c:chartSpace xmlns:c="http://schemas.openxmlformats.org/drawingml/2006/chart" xmlns:a="http://schemas.openxmlformats.org/drawingml/2006/main" xmlns:r="http://schemas.openxmlformats.org/officeDocument/2006/relationships" xmlns:c16r2="http://schemas.microsoft.com/office/drawing/2015/06/chart">
   <c:date1904 val="0"/>
   <c:lang val="en-US"/>
   <c:roundedCorners val="0"/>
@@ -234,21 +233,23 @@
               <c:showSerName val="1"/>
               <c:showPercent val="0"/>
               <c:showBubbleSize val="0"/>
-              <c:extLst xmlns:c16r2="http://schemas.microsoft.com/office/drawing/2015/06/chart">
+              <c:extLst>
+                <c:ext xmlns:c15="http://schemas.microsoft.com/office/drawing/2012/chart" uri="{CE6537A1-D6FC-4f65-9D91-7224C49458BB}">
+                  <c15:layout/>
+                </c:ext>
                 <c:ext xmlns:c16="http://schemas.microsoft.com/office/drawing/2014/chart" uri="{C3380CC4-5D6E-409C-BE32-E72D297353CC}">
                   <c16:uniqueId val="{00000000-CBD6-47AD-B68C-CF16D1E4DC04}"/>
                 </c:ext>
-                <c:ext xmlns:c15="http://schemas.microsoft.com/office/drawing/2012/chart" uri="{CE6537A1-D6FC-4f65-9D91-7224C49458BB}"/>
               </c:extLst>
             </c:dLbl>
             <c:dLbl>
               <c:idx val="1"/>
               <c:delete val="1"/>
-              <c:extLst xmlns:c16r2="http://schemas.microsoft.com/office/drawing/2015/06/chart">
+              <c:extLst>
+                <c:ext xmlns:c15="http://schemas.microsoft.com/office/drawing/2012/chart" uri="{CE6537A1-D6FC-4f65-9D91-7224C49458BB}"/>
                 <c:ext xmlns:c16="http://schemas.microsoft.com/office/drawing/2014/chart" uri="{C3380CC4-5D6E-409C-BE32-E72D297353CC}">
                   <c16:uniqueId val="{00000001-CBD6-47AD-B68C-CF16D1E4DC04}"/>
                 </c:ext>
-                <c:ext xmlns:c15="http://schemas.microsoft.com/office/drawing/2012/chart" uri="{CE6537A1-D6FC-4f65-9D91-7224C49458BB}"/>
               </c:extLst>
             </c:dLbl>
             <c:spPr>
@@ -266,7 +267,7 @@
             <c:showPercent val="0"/>
             <c:showBubbleSize val="0"/>
             <c:showLeaderLines val="0"/>
-            <c:extLst xmlns:c16r2="http://schemas.microsoft.com/office/drawing/2015/06/chart">
+            <c:extLst>
               <c:ext xmlns:c15="http://schemas.microsoft.com/office/drawing/2012/chart" uri="{CE6537A1-D6FC-4f65-9D91-7224C49458BB}">
                 <c15:showLeaderLines val="0"/>
               </c:ext>
@@ -303,7 +304,7 @@
             </c:numRef>
           </c:yVal>
           <c:smooth val="0"/>
-          <c:extLst xmlns:c16r2="http://schemas.microsoft.com/office/drawing/2015/06/chart">
+          <c:extLst>
             <c:ext xmlns:c16="http://schemas.microsoft.com/office/drawing/2014/chart" uri="{C3380CC4-5D6E-409C-BE32-E72D297353CC}">
               <c16:uniqueId val="{00000002-CBD6-47AD-B68C-CF16D1E4DC04}"/>
             </c:ext>
@@ -372,21 +373,23 @@
               <c:showSerName val="1"/>
               <c:showPercent val="0"/>
               <c:showBubbleSize val="0"/>
-              <c:extLst xmlns:c16r2="http://schemas.microsoft.com/office/drawing/2015/06/chart">
+              <c:extLst>
+                <c:ext xmlns:c15="http://schemas.microsoft.com/office/drawing/2012/chart" uri="{CE6537A1-D6FC-4f65-9D91-7224C49458BB}">
+                  <c15:layout/>
+                </c:ext>
                 <c:ext xmlns:c16="http://schemas.microsoft.com/office/drawing/2014/chart" uri="{C3380CC4-5D6E-409C-BE32-E72D297353CC}">
                   <c16:uniqueId val="{00000003-CBD6-47AD-B68C-CF16D1E4DC04}"/>
                 </c:ext>
-                <c:ext xmlns:c15="http://schemas.microsoft.com/office/drawing/2012/chart" uri="{CE6537A1-D6FC-4f65-9D91-7224C49458BB}"/>
               </c:extLst>
             </c:dLbl>
             <c:dLbl>
               <c:idx val="1"/>
               <c:delete val="1"/>
-              <c:extLst xmlns:c16r2="http://schemas.microsoft.com/office/drawing/2015/06/chart">
+              <c:extLst>
+                <c:ext xmlns:c15="http://schemas.microsoft.com/office/drawing/2012/chart" uri="{CE6537A1-D6FC-4f65-9D91-7224C49458BB}"/>
                 <c:ext xmlns:c16="http://schemas.microsoft.com/office/drawing/2014/chart" uri="{C3380CC4-5D6E-409C-BE32-E72D297353CC}">
                   <c16:uniqueId val="{00000004-CBD6-47AD-B68C-CF16D1E4DC04}"/>
                 </c:ext>
-                <c:ext xmlns:c15="http://schemas.microsoft.com/office/drawing/2012/chart" uri="{CE6537A1-D6FC-4f65-9D91-7224C49458BB}"/>
               </c:extLst>
             </c:dLbl>
             <c:spPr>
@@ -404,7 +407,7 @@
             <c:showPercent val="0"/>
             <c:showBubbleSize val="0"/>
             <c:showLeaderLines val="0"/>
-            <c:extLst xmlns:c16r2="http://schemas.microsoft.com/office/drawing/2015/06/chart">
+            <c:extLst>
               <c:ext xmlns:c15="http://schemas.microsoft.com/office/drawing/2012/chart" uri="{CE6537A1-D6FC-4f65-9D91-7224C49458BB}">
                 <c15:showLeaderLines val="0"/>
               </c:ext>
@@ -441,7 +444,7 @@
             </c:numRef>
           </c:yVal>
           <c:smooth val="0"/>
-          <c:extLst xmlns:c16r2="http://schemas.microsoft.com/office/drawing/2015/06/chart">
+          <c:extLst>
             <c:ext xmlns:c16="http://schemas.microsoft.com/office/drawing/2014/chart" uri="{C3380CC4-5D6E-409C-BE32-E72D297353CC}">
               <c16:uniqueId val="{00000005-CBD6-47AD-B68C-CF16D1E4DC04}"/>
             </c:ext>
@@ -475,11 +478,11 @@
             <c:dLbl>
               <c:idx val="0"/>
               <c:delete val="1"/>
-              <c:extLst xmlns:c16r2="http://schemas.microsoft.com/office/drawing/2015/06/chart">
+              <c:extLst>
+                <c:ext xmlns:c15="http://schemas.microsoft.com/office/drawing/2012/chart" uri="{CE6537A1-D6FC-4f65-9D91-7224C49458BB}"/>
                 <c:ext xmlns:c16="http://schemas.microsoft.com/office/drawing/2014/chart" uri="{C3380CC4-5D6E-409C-BE32-E72D297353CC}">
                   <c16:uniqueId val="{00000006-CBD6-47AD-B68C-CF16D1E4DC04}"/>
                 </c:ext>
-                <c:ext xmlns:c15="http://schemas.microsoft.com/office/drawing/2012/chart" uri="{CE6537A1-D6FC-4f65-9D91-7224C49458BB}"/>
               </c:extLst>
             </c:dLbl>
             <c:dLbl>
@@ -520,11 +523,13 @@
               <c:showSerName val="1"/>
               <c:showPercent val="0"/>
               <c:showBubbleSize val="0"/>
-              <c:extLst xmlns:c16r2="http://schemas.microsoft.com/office/drawing/2015/06/chart">
+              <c:extLst>
+                <c:ext xmlns:c15="http://schemas.microsoft.com/office/drawing/2012/chart" uri="{CE6537A1-D6FC-4f65-9D91-7224C49458BB}">
+                  <c15:layout/>
+                </c:ext>
                 <c:ext xmlns:c16="http://schemas.microsoft.com/office/drawing/2014/chart" uri="{C3380CC4-5D6E-409C-BE32-E72D297353CC}">
                   <c16:uniqueId val="{00000007-CBD6-47AD-B68C-CF16D1E4DC04}"/>
                 </c:ext>
-                <c:ext xmlns:c15="http://schemas.microsoft.com/office/drawing/2012/chart" uri="{CE6537A1-D6FC-4f65-9D91-7224C49458BB}"/>
               </c:extLst>
             </c:dLbl>
             <c:spPr>
@@ -542,7 +547,7 @@
             <c:showPercent val="0"/>
             <c:showBubbleSize val="0"/>
             <c:showLeaderLines val="0"/>
-            <c:extLst xmlns:c16r2="http://schemas.microsoft.com/office/drawing/2015/06/chart">
+            <c:extLst>
               <c:ext xmlns:c15="http://schemas.microsoft.com/office/drawing/2012/chart" uri="{CE6537A1-D6FC-4f65-9D91-7224C49458BB}">
                 <c15:showLeaderLines val="0"/>
               </c:ext>
@@ -579,7 +584,7 @@
             </c:numRef>
           </c:yVal>
           <c:smooth val="0"/>
-          <c:extLst xmlns:c16r2="http://schemas.microsoft.com/office/drawing/2015/06/chart">
+          <c:extLst>
             <c:ext xmlns:c16="http://schemas.microsoft.com/office/drawing/2014/chart" uri="{C3380CC4-5D6E-409C-BE32-E72D297353CC}">
               <c16:uniqueId val="{00000008-CBD6-47AD-B68C-CF16D1E4DC04}"/>
             </c:ext>
@@ -648,21 +653,23 @@
               <c:showSerName val="1"/>
               <c:showPercent val="0"/>
               <c:showBubbleSize val="0"/>
-              <c:extLst xmlns:c16r2="http://schemas.microsoft.com/office/drawing/2015/06/chart">
+              <c:extLst>
+                <c:ext xmlns:c15="http://schemas.microsoft.com/office/drawing/2012/chart" uri="{CE6537A1-D6FC-4f65-9D91-7224C49458BB}">
+                  <c15:layout/>
+                </c:ext>
                 <c:ext xmlns:c16="http://schemas.microsoft.com/office/drawing/2014/chart" uri="{C3380CC4-5D6E-409C-BE32-E72D297353CC}">
                   <c16:uniqueId val="{00000009-CBD6-47AD-B68C-CF16D1E4DC04}"/>
                 </c:ext>
-                <c:ext xmlns:c15="http://schemas.microsoft.com/office/drawing/2012/chart" uri="{CE6537A1-D6FC-4f65-9D91-7224C49458BB}"/>
               </c:extLst>
             </c:dLbl>
             <c:dLbl>
               <c:idx val="1"/>
               <c:delete val="1"/>
-              <c:extLst xmlns:c16r2="http://schemas.microsoft.com/office/drawing/2015/06/chart">
+              <c:extLst>
+                <c:ext xmlns:c15="http://schemas.microsoft.com/office/drawing/2012/chart" uri="{CE6537A1-D6FC-4f65-9D91-7224C49458BB}"/>
                 <c:ext xmlns:c16="http://schemas.microsoft.com/office/drawing/2014/chart" uri="{C3380CC4-5D6E-409C-BE32-E72D297353CC}">
                   <c16:uniqueId val="{0000000A-CBD6-47AD-B68C-CF16D1E4DC04}"/>
                 </c:ext>
-                <c:ext xmlns:c15="http://schemas.microsoft.com/office/drawing/2012/chart" uri="{CE6537A1-D6FC-4f65-9D91-7224C49458BB}"/>
               </c:extLst>
             </c:dLbl>
             <c:spPr>
@@ -680,7 +687,7 @@
             <c:showPercent val="0"/>
             <c:showBubbleSize val="0"/>
             <c:showLeaderLines val="0"/>
-            <c:extLst xmlns:c16r2="http://schemas.microsoft.com/office/drawing/2015/06/chart">
+            <c:extLst>
               <c:ext xmlns:c15="http://schemas.microsoft.com/office/drawing/2012/chart" uri="{CE6537A1-D6FC-4f65-9D91-7224C49458BB}">
                 <c15:showLeaderLines val="0"/>
               </c:ext>
@@ -717,7 +724,7 @@
             </c:numRef>
           </c:yVal>
           <c:smooth val="0"/>
-          <c:extLst xmlns:c16r2="http://schemas.microsoft.com/office/drawing/2015/06/chart">
+          <c:extLst>
             <c:ext xmlns:c16="http://schemas.microsoft.com/office/drawing/2014/chart" uri="{C3380CC4-5D6E-409C-BE32-E72D297353CC}">
               <c16:uniqueId val="{0000000B-CBD6-47AD-B68C-CF16D1E4DC04}"/>
             </c:ext>
@@ -786,21 +793,23 @@
               <c:showSerName val="1"/>
               <c:showPercent val="0"/>
               <c:showBubbleSize val="0"/>
-              <c:extLst xmlns:c16r2="http://schemas.microsoft.com/office/drawing/2015/06/chart">
+              <c:extLst>
+                <c:ext xmlns:c15="http://schemas.microsoft.com/office/drawing/2012/chart" uri="{CE6537A1-D6FC-4f65-9D91-7224C49458BB}">
+                  <c15:layout/>
+                </c:ext>
                 <c:ext xmlns:c16="http://schemas.microsoft.com/office/drawing/2014/chart" uri="{C3380CC4-5D6E-409C-BE32-E72D297353CC}">
                   <c16:uniqueId val="{0000000C-CBD6-47AD-B68C-CF16D1E4DC04}"/>
                 </c:ext>
-                <c:ext xmlns:c15="http://schemas.microsoft.com/office/drawing/2012/chart" uri="{CE6537A1-D6FC-4f65-9D91-7224C49458BB}"/>
               </c:extLst>
             </c:dLbl>
             <c:dLbl>
               <c:idx val="1"/>
               <c:delete val="1"/>
-              <c:extLst xmlns:c16r2="http://schemas.microsoft.com/office/drawing/2015/06/chart">
+              <c:extLst>
+                <c:ext xmlns:c15="http://schemas.microsoft.com/office/drawing/2012/chart" uri="{CE6537A1-D6FC-4f65-9D91-7224C49458BB}"/>
                 <c:ext xmlns:c16="http://schemas.microsoft.com/office/drawing/2014/chart" uri="{C3380CC4-5D6E-409C-BE32-E72D297353CC}">
                   <c16:uniqueId val="{0000000D-CBD6-47AD-B68C-CF16D1E4DC04}"/>
                 </c:ext>
-                <c:ext xmlns:c15="http://schemas.microsoft.com/office/drawing/2012/chart" uri="{CE6537A1-D6FC-4f65-9D91-7224C49458BB}"/>
               </c:extLst>
             </c:dLbl>
             <c:spPr>
@@ -818,7 +827,7 @@
             <c:showPercent val="0"/>
             <c:showBubbleSize val="0"/>
             <c:showLeaderLines val="0"/>
-            <c:extLst xmlns:c16r2="http://schemas.microsoft.com/office/drawing/2015/06/chart">
+            <c:extLst>
               <c:ext xmlns:c15="http://schemas.microsoft.com/office/drawing/2012/chart" uri="{CE6537A1-D6FC-4f65-9D91-7224C49458BB}">
                 <c15:showLeaderLines val="0"/>
               </c:ext>
@@ -855,7 +864,7 @@
             </c:numRef>
           </c:yVal>
           <c:smooth val="0"/>
-          <c:extLst xmlns:c16r2="http://schemas.microsoft.com/office/drawing/2015/06/chart">
+          <c:extLst>
             <c:ext xmlns:c16="http://schemas.microsoft.com/office/drawing/2014/chart" uri="{C3380CC4-5D6E-409C-BE32-E72D297353CC}">
               <c16:uniqueId val="{0000000E-CBD6-47AD-B68C-CF16D1E4DC04}"/>
             </c:ext>
@@ -889,11 +898,11 @@
             <c:dLbl>
               <c:idx val="0"/>
               <c:delete val="1"/>
-              <c:extLst xmlns:c16r2="http://schemas.microsoft.com/office/drawing/2015/06/chart">
+              <c:extLst>
+                <c:ext xmlns:c15="http://schemas.microsoft.com/office/drawing/2012/chart" uri="{CE6537A1-D6FC-4f65-9D91-7224C49458BB}"/>
                 <c:ext xmlns:c16="http://schemas.microsoft.com/office/drawing/2014/chart" uri="{C3380CC4-5D6E-409C-BE32-E72D297353CC}">
                   <c16:uniqueId val="{0000000F-CBD6-47AD-B68C-CF16D1E4DC04}"/>
                 </c:ext>
-                <c:ext xmlns:c15="http://schemas.microsoft.com/office/drawing/2012/chart" uri="{CE6537A1-D6FC-4f65-9D91-7224C49458BB}"/>
               </c:extLst>
             </c:dLbl>
             <c:dLbl>
@@ -929,11 +938,13 @@
               <c:showSerName val="1"/>
               <c:showPercent val="0"/>
               <c:showBubbleSize val="0"/>
-              <c:extLst xmlns:c16r2="http://schemas.microsoft.com/office/drawing/2015/06/chart">
+              <c:extLst>
+                <c:ext xmlns:c15="http://schemas.microsoft.com/office/drawing/2012/chart" uri="{CE6537A1-D6FC-4f65-9D91-7224C49458BB}">
+                  <c15:layout/>
+                </c:ext>
                 <c:ext xmlns:c16="http://schemas.microsoft.com/office/drawing/2014/chart" uri="{C3380CC4-5D6E-409C-BE32-E72D297353CC}">
                   <c16:uniqueId val="{00000010-CBD6-47AD-B68C-CF16D1E4DC04}"/>
                 </c:ext>
-                <c:ext xmlns:c15="http://schemas.microsoft.com/office/drawing/2012/chart" uri="{CE6537A1-D6FC-4f65-9D91-7224C49458BB}"/>
               </c:extLst>
             </c:dLbl>
             <c:spPr>
@@ -951,7 +962,7 @@
             <c:showPercent val="0"/>
             <c:showBubbleSize val="0"/>
             <c:showLeaderLines val="0"/>
-            <c:extLst xmlns:c16r2="http://schemas.microsoft.com/office/drawing/2015/06/chart">
+            <c:extLst>
               <c:ext xmlns:c15="http://schemas.microsoft.com/office/drawing/2012/chart" uri="{CE6537A1-D6FC-4f65-9D91-7224C49458BB}">
                 <c15:showLeaderLines val="0"/>
               </c:ext>
@@ -988,7 +999,7 @@
             </c:numRef>
           </c:yVal>
           <c:smooth val="0"/>
-          <c:extLst xmlns:c16r2="http://schemas.microsoft.com/office/drawing/2015/06/chart">
+          <c:extLst>
             <c:ext xmlns:c16="http://schemas.microsoft.com/office/drawing/2014/chart" uri="{C3380CC4-5D6E-409C-BE32-E72D297353CC}">
               <c16:uniqueId val="{00000011-CBD6-47AD-B68C-CF16D1E4DC04}"/>
             </c:ext>
@@ -1061,21 +1072,23 @@
               <c:showSerName val="1"/>
               <c:showPercent val="0"/>
               <c:showBubbleSize val="0"/>
-              <c:extLst xmlns:c16r2="http://schemas.microsoft.com/office/drawing/2015/06/chart">
+              <c:extLst>
+                <c:ext xmlns:c15="http://schemas.microsoft.com/office/drawing/2012/chart" uri="{CE6537A1-D6FC-4f65-9D91-7224C49458BB}">
+                  <c15:layout/>
+                </c:ext>
                 <c:ext xmlns:c16="http://schemas.microsoft.com/office/drawing/2014/chart" uri="{C3380CC4-5D6E-409C-BE32-E72D297353CC}">
                   <c16:uniqueId val="{00000012-CBD6-47AD-B68C-CF16D1E4DC04}"/>
                 </c:ext>
-                <c:ext xmlns:c15="http://schemas.microsoft.com/office/drawing/2012/chart" uri="{CE6537A1-D6FC-4f65-9D91-7224C49458BB}"/>
               </c:extLst>
             </c:dLbl>
             <c:dLbl>
               <c:idx val="1"/>
               <c:delete val="1"/>
-              <c:extLst xmlns:c16r2="http://schemas.microsoft.com/office/drawing/2015/06/chart">
+              <c:extLst>
+                <c:ext xmlns:c15="http://schemas.microsoft.com/office/drawing/2012/chart" uri="{CE6537A1-D6FC-4f65-9D91-7224C49458BB}"/>
                 <c:ext xmlns:c16="http://schemas.microsoft.com/office/drawing/2014/chart" uri="{C3380CC4-5D6E-409C-BE32-E72D297353CC}">
                   <c16:uniqueId val="{00000013-CBD6-47AD-B68C-CF16D1E4DC04}"/>
                 </c:ext>
-                <c:ext xmlns:c15="http://schemas.microsoft.com/office/drawing/2012/chart" uri="{CE6537A1-D6FC-4f65-9D91-7224C49458BB}"/>
               </c:extLst>
             </c:dLbl>
             <c:spPr>
@@ -1093,7 +1106,7 @@
             <c:showPercent val="0"/>
             <c:showBubbleSize val="0"/>
             <c:showLeaderLines val="0"/>
-            <c:extLst xmlns:c16r2="http://schemas.microsoft.com/office/drawing/2015/06/chart">
+            <c:extLst>
               <c:ext xmlns:c15="http://schemas.microsoft.com/office/drawing/2012/chart" uri="{CE6537A1-D6FC-4f65-9D91-7224C49458BB}">
                 <c15:showLeaderLines val="0"/>
               </c:ext>
@@ -1130,7 +1143,7 @@
             </c:numRef>
           </c:yVal>
           <c:smooth val="0"/>
-          <c:extLst xmlns:c16r2="http://schemas.microsoft.com/office/drawing/2015/06/chart">
+          <c:extLst>
             <c:ext xmlns:c16="http://schemas.microsoft.com/office/drawing/2014/chart" uri="{C3380CC4-5D6E-409C-BE32-E72D297353CC}">
               <c16:uniqueId val="{00000014-CBD6-47AD-B68C-CF16D1E4DC04}"/>
             </c:ext>
@@ -1194,7 +1207,7 @@
             </c:numRef>
           </c:yVal>
           <c:smooth val="0"/>
-          <c:extLst xmlns:c16r2="http://schemas.microsoft.com/office/drawing/2015/06/chart">
+          <c:extLst>
             <c:ext xmlns:c16="http://schemas.microsoft.com/office/drawing/2014/chart" uri="{C3380CC4-5D6E-409C-BE32-E72D297353CC}">
               <c16:uniqueId val="{00000015-CBD6-47AD-B68C-CF16D1E4DC04}"/>
             </c:ext>
@@ -1227,11 +1240,11 @@
             <c:dLbl>
               <c:idx val="0"/>
               <c:delete val="1"/>
-              <c:extLst xmlns:c16r2="http://schemas.microsoft.com/office/drawing/2015/06/chart">
+              <c:extLst>
+                <c:ext xmlns:c15="http://schemas.microsoft.com/office/drawing/2012/chart" uri="{CE6537A1-D6FC-4f65-9D91-7224C49458BB}"/>
                 <c:ext xmlns:c16="http://schemas.microsoft.com/office/drawing/2014/chart" uri="{C3380CC4-5D6E-409C-BE32-E72D297353CC}">
                   <c16:uniqueId val="{00000016-CBD6-47AD-B68C-CF16D1E4DC04}"/>
                 </c:ext>
-                <c:ext xmlns:c15="http://schemas.microsoft.com/office/drawing/2012/chart" uri="{CE6537A1-D6FC-4f65-9D91-7224C49458BB}"/>
               </c:extLst>
             </c:dLbl>
             <c:dLbl>
@@ -1272,11 +1285,13 @@
               <c:showSerName val="1"/>
               <c:showPercent val="0"/>
               <c:showBubbleSize val="0"/>
-              <c:extLst xmlns:c16r2="http://schemas.microsoft.com/office/drawing/2015/06/chart">
+              <c:extLst>
+                <c:ext xmlns:c15="http://schemas.microsoft.com/office/drawing/2012/chart" uri="{CE6537A1-D6FC-4f65-9D91-7224C49458BB}">
+                  <c15:layout/>
+                </c:ext>
                 <c:ext xmlns:c16="http://schemas.microsoft.com/office/drawing/2014/chart" uri="{C3380CC4-5D6E-409C-BE32-E72D297353CC}">
                   <c16:uniqueId val="{00000017-CBD6-47AD-B68C-CF16D1E4DC04}"/>
                 </c:ext>
-                <c:ext xmlns:c15="http://schemas.microsoft.com/office/drawing/2012/chart" uri="{CE6537A1-D6FC-4f65-9D91-7224C49458BB}"/>
               </c:extLst>
             </c:dLbl>
             <c:spPr>
@@ -1294,7 +1309,7 @@
             <c:showPercent val="0"/>
             <c:showBubbleSize val="0"/>
             <c:showLeaderLines val="0"/>
-            <c:extLst xmlns:c16r2="http://schemas.microsoft.com/office/drawing/2015/06/chart">
+            <c:extLst>
               <c:ext xmlns:c15="http://schemas.microsoft.com/office/drawing/2012/chart" uri="{CE6537A1-D6FC-4f65-9D91-7224C49458BB}">
                 <c15:showLeaderLines val="0"/>
               </c:ext>
@@ -1331,7 +1346,7 @@
             </c:numRef>
           </c:yVal>
           <c:smooth val="0"/>
-          <c:extLst xmlns:c16r2="http://schemas.microsoft.com/office/drawing/2015/06/chart">
+          <c:extLst>
             <c:ext xmlns:c16="http://schemas.microsoft.com/office/drawing/2014/chart" uri="{C3380CC4-5D6E-409C-BE32-E72D297353CC}">
               <c16:uniqueId val="{00000018-CBD6-47AD-B68C-CF16D1E4DC04}"/>
             </c:ext>
@@ -1395,7 +1410,7 @@
             </c:numRef>
           </c:yVal>
           <c:smooth val="0"/>
-          <c:extLst xmlns:c16r2="http://schemas.microsoft.com/office/drawing/2015/06/chart">
+          <c:extLst>
             <c:ext xmlns:c16="http://schemas.microsoft.com/office/drawing/2014/chart" uri="{C3380CC4-5D6E-409C-BE32-E72D297353CC}">
               <c16:uniqueId val="{00000019-CBD6-47AD-B68C-CF16D1E4DC04}"/>
             </c:ext>
@@ -1428,11 +1443,11 @@
             <c:dLbl>
               <c:idx val="0"/>
               <c:delete val="1"/>
-              <c:extLst xmlns:c16r2="http://schemas.microsoft.com/office/drawing/2015/06/chart">
+              <c:extLst>
+                <c:ext xmlns:c15="http://schemas.microsoft.com/office/drawing/2012/chart" uri="{CE6537A1-D6FC-4f65-9D91-7224C49458BB}"/>
                 <c:ext xmlns:c16="http://schemas.microsoft.com/office/drawing/2014/chart" uri="{C3380CC4-5D6E-409C-BE32-E72D297353CC}">
                   <c16:uniqueId val="{0000001A-CBD6-47AD-B68C-CF16D1E4DC04}"/>
                 </c:ext>
-                <c:ext xmlns:c15="http://schemas.microsoft.com/office/drawing/2012/chart" uri="{CE6537A1-D6FC-4f65-9D91-7224C49458BB}"/>
               </c:extLst>
             </c:dLbl>
             <c:dLbl>
@@ -1473,11 +1488,13 @@
               <c:showSerName val="1"/>
               <c:showPercent val="0"/>
               <c:showBubbleSize val="0"/>
-              <c:extLst xmlns:c16r2="http://schemas.microsoft.com/office/drawing/2015/06/chart">
+              <c:extLst>
+                <c:ext xmlns:c15="http://schemas.microsoft.com/office/drawing/2012/chart" uri="{CE6537A1-D6FC-4f65-9D91-7224C49458BB}">
+                  <c15:layout/>
+                </c:ext>
                 <c:ext xmlns:c16="http://schemas.microsoft.com/office/drawing/2014/chart" uri="{C3380CC4-5D6E-409C-BE32-E72D297353CC}">
                   <c16:uniqueId val="{0000001B-CBD6-47AD-B68C-CF16D1E4DC04}"/>
                 </c:ext>
-                <c:ext xmlns:c15="http://schemas.microsoft.com/office/drawing/2012/chart" uri="{CE6537A1-D6FC-4f65-9D91-7224C49458BB}"/>
               </c:extLst>
             </c:dLbl>
             <c:spPr>
@@ -1495,7 +1512,7 @@
             <c:showPercent val="0"/>
             <c:showBubbleSize val="0"/>
             <c:showLeaderLines val="0"/>
-            <c:extLst xmlns:c16r2="http://schemas.microsoft.com/office/drawing/2015/06/chart">
+            <c:extLst>
               <c:ext xmlns:c15="http://schemas.microsoft.com/office/drawing/2012/chart" uri="{CE6537A1-D6FC-4f65-9D91-7224C49458BB}">
                 <c15:showLeaderLines val="0"/>
               </c:ext>
@@ -1532,7 +1549,7 @@
             </c:numRef>
           </c:yVal>
           <c:smooth val="0"/>
-          <c:extLst xmlns:c16r2="http://schemas.microsoft.com/office/drawing/2015/06/chart">
+          <c:extLst>
             <c:ext xmlns:c16="http://schemas.microsoft.com/office/drawing/2014/chart" uri="{C3380CC4-5D6E-409C-BE32-E72D297353CC}">
               <c16:uniqueId val="{0000001C-CBD6-47AD-B68C-CF16D1E4DC04}"/>
             </c:ext>
@@ -1565,11 +1582,11 @@
             <c:dLbl>
               <c:idx val="0"/>
               <c:delete val="1"/>
-              <c:extLst xmlns:c16r2="http://schemas.microsoft.com/office/drawing/2015/06/chart">
+              <c:extLst>
+                <c:ext xmlns:c15="http://schemas.microsoft.com/office/drawing/2012/chart" uri="{CE6537A1-D6FC-4f65-9D91-7224C49458BB}"/>
                 <c:ext xmlns:c16="http://schemas.microsoft.com/office/drawing/2014/chart" uri="{C3380CC4-5D6E-409C-BE32-E72D297353CC}">
                   <c16:uniqueId val="{0000001D-CBD6-47AD-B68C-CF16D1E4DC04}"/>
                 </c:ext>
-                <c:ext xmlns:c15="http://schemas.microsoft.com/office/drawing/2012/chart" uri="{CE6537A1-D6FC-4f65-9D91-7224C49458BB}"/>
               </c:extLst>
             </c:dLbl>
             <c:dLbl>
@@ -1610,11 +1627,13 @@
               <c:showSerName val="1"/>
               <c:showPercent val="0"/>
               <c:showBubbleSize val="0"/>
-              <c:extLst xmlns:c16r2="http://schemas.microsoft.com/office/drawing/2015/06/chart">
+              <c:extLst>
+                <c:ext xmlns:c15="http://schemas.microsoft.com/office/drawing/2012/chart" uri="{CE6537A1-D6FC-4f65-9D91-7224C49458BB}">
+                  <c15:layout/>
+                </c:ext>
                 <c:ext xmlns:c16="http://schemas.microsoft.com/office/drawing/2014/chart" uri="{C3380CC4-5D6E-409C-BE32-E72D297353CC}">
                   <c16:uniqueId val="{0000001E-CBD6-47AD-B68C-CF16D1E4DC04}"/>
                 </c:ext>
-                <c:ext xmlns:c15="http://schemas.microsoft.com/office/drawing/2012/chart" uri="{CE6537A1-D6FC-4f65-9D91-7224C49458BB}"/>
               </c:extLst>
             </c:dLbl>
             <c:spPr>
@@ -1632,7 +1651,7 @@
             <c:showPercent val="0"/>
             <c:showBubbleSize val="0"/>
             <c:showLeaderLines val="0"/>
-            <c:extLst xmlns:c16r2="http://schemas.microsoft.com/office/drawing/2015/06/chart">
+            <c:extLst>
               <c:ext xmlns:c15="http://schemas.microsoft.com/office/drawing/2012/chart" uri="{CE6537A1-D6FC-4f65-9D91-7224C49458BB}">
                 <c15:showLeaderLines val="0"/>
               </c:ext>
@@ -1669,7 +1688,7 @@
             </c:numRef>
           </c:yVal>
           <c:smooth val="0"/>
-          <c:extLst xmlns:c16r2="http://schemas.microsoft.com/office/drawing/2015/06/chart">
+          <c:extLst>
             <c:ext xmlns:c16="http://schemas.microsoft.com/office/drawing/2014/chart" uri="{C3380CC4-5D6E-409C-BE32-E72D297353CC}">
               <c16:uniqueId val="{0000001F-CBD6-47AD-B68C-CF16D1E4DC04}"/>
             </c:ext>
@@ -1848,7 +1867,7 @@
           <a:p>
             <a:fld id="{82AF1EC4-0AE9-4ABA-827F-84879B727577}" type="datetimeFigureOut">
               <a:rPr lang="en-US" smtClean="0"/>
-              <a:t>3/17/2016</a:t>
+              <a:t>3/28/2016</a:t>
             </a:fld>
             <a:endParaRPr lang="en-US"/>
           </a:p>
@@ -2273,7 +2292,7 @@
           <a:p>
             <a:fld id="{64DBF1C4-A8A4-46A4-960B-68980B6D50C1}" type="slidenum">
               <a:rPr lang="en-US" smtClean="0"/>
-              <a:t>10</a:t>
+              <a:t>9</a:t>
             </a:fld>
             <a:endParaRPr lang="en-US"/>
           </a:p>
@@ -2357,7 +2376,7 @@
           <a:p>
             <a:fld id="{64DBF1C4-A8A4-46A4-960B-68980B6D50C1}" type="slidenum">
               <a:rPr lang="en-US" smtClean="0"/>
-              <a:t>11</a:t>
+              <a:t>10</a:t>
             </a:fld>
             <a:endParaRPr lang="en-US"/>
           </a:p>
@@ -2441,7 +2460,7 @@
           <a:p>
             <a:fld id="{64DBF1C4-A8A4-46A4-960B-68980B6D50C1}" type="slidenum">
               <a:rPr lang="en-US" smtClean="0"/>
-              <a:t>12</a:t>
+              <a:t>11</a:t>
             </a:fld>
             <a:endParaRPr lang="en-US"/>
           </a:p>
@@ -2654,7 +2673,7 @@
           <a:p>
             <a:fld id="{3EAEFB75-4DE4-4DFC-B956-52D01254B927}" type="datetimeFigureOut">
               <a:rPr lang="en-US" smtClean="0"/>
-              <a:t>3/17/2016</a:t>
+              <a:t>3/28/2016</a:t>
             </a:fld>
             <a:endParaRPr lang="en-US"/>
           </a:p>
@@ -3007,7 +3026,7 @@
           <a:p>
             <a:fld id="{3EAEFB75-4DE4-4DFC-B956-52D01254B927}" type="datetimeFigureOut">
               <a:rPr lang="en-US" smtClean="0"/>
-              <a:t>3/17/2016</a:t>
+              <a:t>3/28/2016</a:t>
             </a:fld>
             <a:endParaRPr lang="en-US"/>
           </a:p>
@@ -3182,7 +3201,7 @@
           <a:p>
             <a:fld id="{3EAEFB75-4DE4-4DFC-B956-52D01254B927}" type="datetimeFigureOut">
               <a:rPr lang="en-US" smtClean="0"/>
-              <a:t>3/17/2016</a:t>
+              <a:t>3/28/2016</a:t>
             </a:fld>
             <a:endParaRPr lang="en-US"/>
           </a:p>
@@ -3295,7 +3314,7 @@
           <a:p>
             <a:fld id="{3EAEFB75-4DE4-4DFC-B956-52D01254B927}" type="datetimeFigureOut">
               <a:rPr lang="en-US" smtClean="0"/>
-              <a:t>3/17/2016</a:t>
+              <a:t>3/28/2016</a:t>
             </a:fld>
             <a:endParaRPr lang="en-US"/>
           </a:p>
@@ -3653,7 +3672,7 @@
           <a:p>
             <a:fld id="{3EAEFB75-4DE4-4DFC-B956-52D01254B927}" type="datetimeFigureOut">
               <a:rPr lang="en-US" smtClean="0"/>
-              <a:t>3/17/2016</a:t>
+              <a:t>3/28/2016</a:t>
             </a:fld>
             <a:endParaRPr lang="en-US"/>
           </a:p>
@@ -3918,7 +3937,7 @@
           <a:p>
             <a:fld id="{3EAEFB75-4DE4-4DFC-B956-52D01254B927}" type="datetimeFigureOut">
               <a:rPr lang="en-US" smtClean="0"/>
-              <a:t>3/17/2016</a:t>
+              <a:t>3/28/2016</a:t>
             </a:fld>
             <a:endParaRPr lang="en-US"/>
           </a:p>
@@ -4280,7 +4299,7 @@
           <a:p>
             <a:fld id="{3EAEFB75-4DE4-4DFC-B956-52D01254B927}" type="datetimeFigureOut">
               <a:rPr lang="en-US" smtClean="0"/>
-              <a:t>3/17/2016</a:t>
+              <a:t>3/28/2016</a:t>
             </a:fld>
             <a:endParaRPr lang="en-US"/>
           </a:p>
@@ -4507,7 +4526,7 @@
           <a:p>
             <a:fld id="{3EAEFB75-4DE4-4DFC-B956-52D01254B927}" type="datetimeFigureOut">
               <a:rPr lang="en-US" smtClean="0"/>
-              <a:t>3/17/2016</a:t>
+              <a:t>3/28/2016</a:t>
             </a:fld>
             <a:endParaRPr lang="en-US"/>
           </a:p>
@@ -4597,7 +4616,7 @@
           <a:p>
             <a:fld id="{3EAEFB75-4DE4-4DFC-B956-52D01254B927}" type="datetimeFigureOut">
               <a:rPr lang="en-US" smtClean="0"/>
-              <a:t>3/17/2016</a:t>
+              <a:t>3/28/2016</a:t>
             </a:fld>
             <a:endParaRPr lang="en-US"/>
           </a:p>
@@ -4864,7 +4883,7 @@
           <a:p>
             <a:fld id="{3EAEFB75-4DE4-4DFC-B956-52D01254B927}" type="datetimeFigureOut">
               <a:rPr lang="en-US" smtClean="0"/>
-              <a:t>3/17/2016</a:t>
+              <a:t>3/28/2016</a:t>
             </a:fld>
             <a:endParaRPr lang="en-US"/>
           </a:p>
@@ -5092,7 +5111,7 @@
           <a:p>
             <a:fld id="{3EAEFB75-4DE4-4DFC-B956-52D01254B927}" type="datetimeFigureOut">
               <a:rPr lang="en-US" smtClean="0"/>
-              <a:t>3/17/2016</a:t>
+              <a:t>3/28/2016</a:t>
             </a:fld>
             <a:endParaRPr lang="en-US"/>
           </a:p>
@@ -5591,7 +5610,7 @@
           <a:p>
             <a:fld id="{3EAEFB75-4DE4-4DFC-B956-52D01254B927}" type="datetimeFigureOut">
               <a:rPr lang="en-US" smtClean="0"/>
-              <a:t>3/17/2016</a:t>
+              <a:t>3/28/2016</a:t>
             </a:fld>
             <a:endParaRPr lang="en-US"/>
           </a:p>
@@ -6253,193 +6272,6 @@
       </p:grpSpPr>
       <p:sp>
         <p:nvSpPr>
-          <p:cNvPr id="5" name="TextBox 4"/>
-          <p:cNvSpPr txBox="1"/>
-          <p:nvPr/>
-        </p:nvSpPr>
-        <p:spPr>
-          <a:xfrm>
-            <a:off x="152400" y="4655413"/>
-            <a:ext cx="8991600" cy="584775"/>
-          </a:xfrm>
-          <a:prstGeom prst="rect">
-            <a:avLst/>
-          </a:prstGeom>
-          <a:noFill/>
-        </p:spPr>
-        <p:txBody>
-          <a:bodyPr wrap="square" rtlCol="0">
-            <a:spAutoFit/>
-          </a:bodyPr>
-          <a:lstStyle/>
-          <a:p>
-            <a:r>
-              <a:rPr lang="en-US" sz="1600" dirty="0">
-                <a:latin typeface="+mj-lt"/>
-              </a:rPr>
-              <a:t>*  All team members involved 	† - Developers and testers involved      ‡ - Business Analysts involved</a:t>
-            </a:r>
-          </a:p>
-          <a:p>
-            <a:r>
-              <a:rPr lang="en-US" sz="1600" dirty="0">
-                <a:latin typeface="+mj-lt"/>
-              </a:rPr>
-              <a:t>Milestones and tasks in </a:t>
-            </a:r>
-            <a:r>
-              <a:rPr lang="en-US" sz="1600" dirty="0">
-                <a:solidFill>
-                  <a:srgbClr val="7030A0"/>
-                </a:solidFill>
-                <a:latin typeface="+mj-lt"/>
-              </a:rPr>
-              <a:t>purple</a:t>
-            </a:r>
-            <a:r>
-              <a:rPr lang="en-US" sz="1600" dirty="0">
-                <a:latin typeface="+mj-lt"/>
-              </a:rPr>
-              <a:t> and </a:t>
-            </a:r>
-            <a:r>
-              <a:rPr lang="en-US" sz="1600" dirty="0">
-                <a:solidFill>
-                  <a:srgbClr val="002060"/>
-                </a:solidFill>
-                <a:latin typeface="+mj-lt"/>
-              </a:rPr>
-              <a:t>dark blue</a:t>
-            </a:r>
-            <a:r>
-              <a:rPr lang="en-US" sz="1600" dirty="0">
-                <a:latin typeface="+mj-lt"/>
-              </a:rPr>
-              <a:t> are complete. Remainder are in progress or in the future</a:t>
-            </a:r>
-          </a:p>
-        </p:txBody>
-      </p:sp>
-      <p:graphicFrame>
-        <p:nvGraphicFramePr>
-          <p:cNvPr id="6" name="Chart 5"/>
-          <p:cNvGraphicFramePr>
-            <a:graphicFrameLocks/>
-          </p:cNvGraphicFramePr>
-          <p:nvPr>
-            <p:extLst/>
-          </p:nvPr>
-        </p:nvGraphicFramePr>
-        <p:xfrm>
-          <a:off x="430530" y="647700"/>
-          <a:ext cx="8282940" cy="3886200"/>
-        </p:xfrm>
-        <a:graphic>
-          <a:graphicData uri="http://schemas.openxmlformats.org/drawingml/2006/chart">
-            <c:chart xmlns:c="http://schemas.openxmlformats.org/drawingml/2006/chart" xmlns:r="http://schemas.openxmlformats.org/officeDocument/2006/relationships" r:id="rId3"/>
-          </a:graphicData>
-        </a:graphic>
-      </p:graphicFrame>
-      <p:sp>
-        <p:nvSpPr>
-          <p:cNvPr id="8" name="Title 1"/>
-          <p:cNvSpPr txBox="1">
-            <a:spLocks/>
-          </p:cNvSpPr>
-          <p:nvPr/>
-        </p:nvSpPr>
-        <p:spPr>
-          <a:xfrm>
-            <a:off x="762000" y="190500"/>
-            <a:ext cx="8153400" cy="609600"/>
-          </a:xfrm>
-          <a:prstGeom prst="rect">
-            <a:avLst/>
-          </a:prstGeom>
-          <a:solidFill>
-            <a:schemeClr val="bg1"/>
-          </a:solidFill>
-        </p:spPr>
-        <p:txBody>
-          <a:bodyPr bIns="91440" anchor="b" anchorCtr="0">
-            <a:noAutofit/>
-          </a:bodyPr>
-          <a:lstStyle>
-            <a:lvl1pPr algn="l" rtl="0" eaLnBrk="1" latinLnBrk="0" hangingPunct="1">
-              <a:spcBef>
-                <a:spcPct val="0"/>
-              </a:spcBef>
-              <a:buNone/>
-              <a:defRPr kumimoji="0" sz="4000" kern="1200">
-                <a:solidFill>
-                  <a:schemeClr val="tx2"/>
-                </a:solidFill>
-                <a:latin typeface="+mj-lt"/>
-                <a:ea typeface="+mj-ea"/>
-                <a:cs typeface="+mj-cs"/>
-              </a:defRPr>
-            </a:lvl1pPr>
-          </a:lstStyle>
-          <a:p>
-            <a:r>
-              <a:rPr lang="en-US" sz="3600" dirty="0" smtClean="0"/>
-              <a:t>Updated</a:t>
-            </a:r>
-            <a:r>
-              <a:rPr lang="en-US" sz="3200" dirty="0" smtClean="0"/>
-              <a:t> Gantt Chart</a:t>
-            </a:r>
-            <a:endParaRPr lang="en-US" sz="3200" dirty="0"/>
-          </a:p>
-        </p:txBody>
-      </p:sp>
-    </p:spTree>
-    <p:extLst>
-      <p:ext uri="{BB962C8B-B14F-4D97-AF65-F5344CB8AC3E}">
-        <p14:creationId xmlns:p14="http://schemas.microsoft.com/office/powerpoint/2010/main" val="1153010175"/>
-      </p:ext>
-    </p:extLst>
-  </p:cSld>
-  <p:clrMapOvr>
-    <a:masterClrMapping/>
-  </p:clrMapOvr>
-  <mc:AlternateContent xmlns:mc="http://schemas.openxmlformats.org/markup-compatibility/2006" xmlns:p14="http://schemas.microsoft.com/office/powerpoint/2010/main">
-    <mc:Choice Requires="p14">
-      <p:transition p14:dur="250" advTm="36883"/>
-    </mc:Choice>
-    <mc:Fallback xmlns="">
-      <p:transition advTm="36883"/>
-    </mc:Fallback>
-  </mc:AlternateContent>
-  <p:timing>
-    <p:tnLst>
-      <p:par>
-        <p:cTn id="1" dur="indefinite" restart="never" nodeType="tmRoot"/>
-      </p:par>
-    </p:tnLst>
-  </p:timing>
-</p:sld>
-</file>
-
-<file path=ppt/slides/slide11.xml><?xml version="1.0" encoding="utf-8"?>
-<p:sld xmlns:a="http://schemas.openxmlformats.org/drawingml/2006/main" xmlns:r="http://schemas.openxmlformats.org/officeDocument/2006/relationships" xmlns:p="http://schemas.openxmlformats.org/presentationml/2006/main">
-  <p:cSld>
-    <p:spTree>
-      <p:nvGrpSpPr>
-        <p:cNvPr id="1" name=""/>
-        <p:cNvGrpSpPr/>
-        <p:nvPr/>
-      </p:nvGrpSpPr>
-      <p:grpSpPr>
-        <a:xfrm>
-          <a:off x="0" y="0"/>
-          <a:ext cx="0" cy="0"/>
-          <a:chOff x="0" y="0"/>
-          <a:chExt cx="0" cy="0"/>
-        </a:xfrm>
-      </p:grpSpPr>
-      <p:sp>
-        <p:nvSpPr>
           <p:cNvPr id="3" name="Content Placeholder 2"/>
           <p:cNvSpPr>
             <a:spLocks noGrp="1"/>
@@ -6538,7 +6370,7 @@
 </p:sld>
 </file>
 
-<file path=ppt/slides/slide12.xml><?xml version="1.0" encoding="utf-8"?>
+<file path=ppt/slides/slide11.xml><?xml version="1.0" encoding="utf-8"?>
 <p:sld xmlns:a="http://schemas.openxmlformats.org/drawingml/2006/main" xmlns:r="http://schemas.openxmlformats.org/officeDocument/2006/relationships" xmlns:p="http://schemas.openxmlformats.org/presentationml/2006/main">
   <p:cSld>
     <p:spTree>
@@ -6653,44 +6485,54 @@
           <a:chExt cx="0" cy="0"/>
         </a:xfrm>
       </p:grpSpPr>
-      <p:sp>
-        <p:nvSpPr>
-          <p:cNvPr id="2" name="Title 1"/>
-          <p:cNvSpPr>
-            <a:spLocks noGrp="1"/>
-          </p:cNvSpPr>
-          <p:nvPr>
-            <p:ph type="title"/>
-          </p:nvPr>
-        </p:nvSpPr>
-        <p:spPr/>
-        <p:txBody>
-          <a:bodyPr/>
-          <a:lstStyle/>
-          <a:p>
-            <a:endParaRPr lang="en-US"/>
-          </a:p>
-        </p:txBody>
-      </p:sp>
-      <p:sp>
-        <p:nvSpPr>
-          <p:cNvPr id="3" name="Content Placeholder 2"/>
-          <p:cNvSpPr>
-            <a:spLocks noGrp="1"/>
-          </p:cNvSpPr>
-          <p:nvPr>
-            <p:ph sz="quarter" idx="1"/>
-          </p:nvPr>
-        </p:nvSpPr>
-        <p:spPr/>
-        <p:txBody>
-          <a:bodyPr/>
-          <a:lstStyle/>
-          <a:p>
-            <a:endParaRPr lang="en-US"/>
-          </a:p>
-        </p:txBody>
-      </p:sp>
+      <p:pic>
+        <p:nvPicPr>
+          <p:cNvPr id="5" name="Picture 4"/>
+          <p:cNvPicPr>
+            <a:picLocks noChangeAspect="1"/>
+          </p:cNvPicPr>
+          <p:nvPr/>
+        </p:nvPicPr>
+        <p:blipFill>
+          <a:blip r:embed="rId2"/>
+          <a:stretch>
+            <a:fillRect/>
+          </a:stretch>
+        </p:blipFill>
+        <p:spPr>
+          <a:xfrm>
+            <a:off x="533400" y="723900"/>
+            <a:ext cx="3433653" cy="4191000"/>
+          </a:xfrm>
+          <a:prstGeom prst="rect">
+            <a:avLst/>
+          </a:prstGeom>
+        </p:spPr>
+      </p:pic>
+      <p:pic>
+        <p:nvPicPr>
+          <p:cNvPr id="6" name="Picture 5"/>
+          <p:cNvPicPr>
+            <a:picLocks noChangeAspect="1"/>
+          </p:cNvPicPr>
+          <p:nvPr/>
+        </p:nvPicPr>
+        <p:blipFill>
+          <a:blip r:embed="rId3"/>
+          <a:stretch>
+            <a:fillRect/>
+          </a:stretch>
+        </p:blipFill>
+        <p:spPr>
+          <a:xfrm>
+            <a:off x="4267200" y="706244"/>
+            <a:ext cx="4340757" cy="4114800"/>
+          </a:xfrm>
+          <a:prstGeom prst="rect">
+            <a:avLst/>
+          </a:prstGeom>
+        </p:spPr>
+      </p:pic>
     </p:spTree>
     <p:extLst>
       <p:ext uri="{BB962C8B-B14F-4D97-AF65-F5344CB8AC3E}">
@@ -6721,44 +6563,30 @@
           <a:chExt cx="0" cy="0"/>
         </a:xfrm>
       </p:grpSpPr>
-      <p:sp>
-        <p:nvSpPr>
-          <p:cNvPr id="2" name="Title 1"/>
-          <p:cNvSpPr>
-            <a:spLocks noGrp="1"/>
-          </p:cNvSpPr>
-          <p:nvPr>
-            <p:ph type="title"/>
-          </p:nvPr>
-        </p:nvSpPr>
-        <p:spPr/>
-        <p:txBody>
-          <a:bodyPr/>
-          <a:lstStyle/>
-          <a:p>
-            <a:endParaRPr lang="en-US"/>
-          </a:p>
-        </p:txBody>
-      </p:sp>
-      <p:sp>
-        <p:nvSpPr>
-          <p:cNvPr id="3" name="Content Placeholder 2"/>
-          <p:cNvSpPr>
-            <a:spLocks noGrp="1"/>
-          </p:cNvSpPr>
-          <p:nvPr>
-            <p:ph sz="quarter" idx="1"/>
-          </p:nvPr>
-        </p:nvSpPr>
-        <p:spPr/>
-        <p:txBody>
-          <a:bodyPr/>
-          <a:lstStyle/>
-          <a:p>
-            <a:endParaRPr lang="en-US"/>
-          </a:p>
-        </p:txBody>
-      </p:sp>
+      <p:pic>
+        <p:nvPicPr>
+          <p:cNvPr id="4" name="Picture 3"/>
+          <p:cNvPicPr>
+            <a:picLocks noChangeAspect="1"/>
+          </p:cNvPicPr>
+          <p:nvPr/>
+        </p:nvPicPr>
+        <p:blipFill>
+          <a:blip r:embed="rId2"/>
+          <a:stretch>
+            <a:fillRect/>
+          </a:stretch>
+        </p:blipFill>
+        <p:spPr>
+          <a:xfrm>
+            <a:off x="1295400" y="114300"/>
+            <a:ext cx="6858000" cy="5339114"/>
+          </a:xfrm>
+          <a:prstGeom prst="rect">
+            <a:avLst/>
+          </a:prstGeom>
+        </p:spPr>
+      </p:pic>
     </p:spTree>
     <p:extLst>
       <p:ext uri="{BB962C8B-B14F-4D97-AF65-F5344CB8AC3E}">
@@ -6789,44 +6617,30 @@
           <a:chExt cx="0" cy="0"/>
         </a:xfrm>
       </p:grpSpPr>
-      <p:sp>
-        <p:nvSpPr>
-          <p:cNvPr id="2" name="Title 1"/>
-          <p:cNvSpPr>
-            <a:spLocks noGrp="1"/>
-          </p:cNvSpPr>
-          <p:nvPr>
-            <p:ph type="title"/>
-          </p:nvPr>
-        </p:nvSpPr>
-        <p:spPr/>
-        <p:txBody>
-          <a:bodyPr/>
-          <a:lstStyle/>
-          <a:p>
-            <a:endParaRPr lang="en-US"/>
-          </a:p>
-        </p:txBody>
-      </p:sp>
-      <p:sp>
-        <p:nvSpPr>
-          <p:cNvPr id="3" name="Content Placeholder 2"/>
-          <p:cNvSpPr>
-            <a:spLocks noGrp="1"/>
-          </p:cNvSpPr>
-          <p:nvPr>
-            <p:ph sz="quarter" idx="1"/>
-          </p:nvPr>
-        </p:nvSpPr>
-        <p:spPr/>
-        <p:txBody>
-          <a:bodyPr/>
-          <a:lstStyle/>
-          <a:p>
-            <a:endParaRPr lang="en-US"/>
-          </a:p>
-        </p:txBody>
-      </p:sp>
+      <p:pic>
+        <p:nvPicPr>
+          <p:cNvPr id="5" name="Picture 4"/>
+          <p:cNvPicPr>
+            <a:picLocks noChangeAspect="1"/>
+          </p:cNvPicPr>
+          <p:nvPr/>
+        </p:nvPicPr>
+        <p:blipFill>
+          <a:blip r:embed="rId2"/>
+          <a:stretch>
+            <a:fillRect/>
+          </a:stretch>
+        </p:blipFill>
+        <p:spPr>
+          <a:xfrm>
+            <a:off x="1371600" y="114299"/>
+            <a:ext cx="5943600" cy="5488345"/>
+          </a:xfrm>
+          <a:prstGeom prst="rect">
+            <a:avLst/>
+          </a:prstGeom>
+        </p:spPr>
+      </p:pic>
     </p:spTree>
     <p:extLst>
       <p:ext uri="{BB962C8B-B14F-4D97-AF65-F5344CB8AC3E}">
@@ -6857,48 +6671,34 @@
           <a:chExt cx="0" cy="0"/>
         </a:xfrm>
       </p:grpSpPr>
-      <p:sp>
-        <p:nvSpPr>
-          <p:cNvPr id="2" name="Title 1"/>
-          <p:cNvSpPr>
-            <a:spLocks noGrp="1"/>
-          </p:cNvSpPr>
-          <p:nvPr>
-            <p:ph type="title"/>
-          </p:nvPr>
-        </p:nvSpPr>
-        <p:spPr/>
-        <p:txBody>
-          <a:bodyPr/>
-          <a:lstStyle/>
-          <a:p>
-            <a:endParaRPr lang="en-US"/>
-          </a:p>
-        </p:txBody>
-      </p:sp>
-      <p:sp>
-        <p:nvSpPr>
-          <p:cNvPr id="3" name="Content Placeholder 2"/>
-          <p:cNvSpPr>
-            <a:spLocks noGrp="1"/>
-          </p:cNvSpPr>
-          <p:nvPr>
-            <p:ph sz="quarter" idx="1"/>
-          </p:nvPr>
-        </p:nvSpPr>
-        <p:spPr/>
-        <p:txBody>
-          <a:bodyPr/>
-          <a:lstStyle/>
-          <a:p>
-            <a:endParaRPr lang="en-US"/>
-          </a:p>
-        </p:txBody>
-      </p:sp>
+      <p:pic>
+        <p:nvPicPr>
+          <p:cNvPr id="4" name="Picture 3"/>
+          <p:cNvPicPr>
+            <a:picLocks noChangeAspect="1"/>
+          </p:cNvPicPr>
+          <p:nvPr/>
+        </p:nvPicPr>
+        <p:blipFill>
+          <a:blip r:embed="rId2"/>
+          <a:stretch>
+            <a:fillRect/>
+          </a:stretch>
+        </p:blipFill>
+        <p:spPr>
+          <a:xfrm>
+            <a:off x="1066800" y="114301"/>
+            <a:ext cx="6895692" cy="5410200"/>
+          </a:xfrm>
+          <a:prstGeom prst="rect">
+            <a:avLst/>
+          </a:prstGeom>
+        </p:spPr>
+      </p:pic>
     </p:spTree>
     <p:extLst>
       <p:ext uri="{BB962C8B-B14F-4D97-AF65-F5344CB8AC3E}">
-        <p14:creationId xmlns:p14="http://schemas.microsoft.com/office/powerpoint/2010/main" val="1949008584"/>
+        <p14:creationId xmlns:p14="http://schemas.microsoft.com/office/powerpoint/2010/main" val="147723909"/>
       </p:ext>
     </p:extLst>
   </p:cSld>
@@ -6925,44 +6725,30 @@
           <a:chExt cx="0" cy="0"/>
         </a:xfrm>
       </p:grpSpPr>
-      <p:sp>
-        <p:nvSpPr>
-          <p:cNvPr id="2" name="Title 1"/>
-          <p:cNvSpPr>
-            <a:spLocks noGrp="1"/>
-          </p:cNvSpPr>
-          <p:nvPr>
-            <p:ph type="title"/>
-          </p:nvPr>
-        </p:nvSpPr>
-        <p:spPr/>
-        <p:txBody>
-          <a:bodyPr/>
-          <a:lstStyle/>
-          <a:p>
-            <a:endParaRPr lang="en-US"/>
-          </a:p>
-        </p:txBody>
-      </p:sp>
-      <p:sp>
-        <p:nvSpPr>
-          <p:cNvPr id="3" name="Content Placeholder 2"/>
-          <p:cNvSpPr>
-            <a:spLocks noGrp="1"/>
-          </p:cNvSpPr>
-          <p:nvPr>
-            <p:ph sz="quarter" idx="1"/>
-          </p:nvPr>
-        </p:nvSpPr>
-        <p:spPr/>
-        <p:txBody>
-          <a:bodyPr/>
-          <a:lstStyle/>
-          <a:p>
-            <a:endParaRPr lang="en-US"/>
-          </a:p>
-        </p:txBody>
-      </p:sp>
+      <p:pic>
+        <p:nvPicPr>
+          <p:cNvPr id="4" name="Picture 3"/>
+          <p:cNvPicPr>
+            <a:picLocks noChangeAspect="1"/>
+          </p:cNvPicPr>
+          <p:nvPr/>
+        </p:nvPicPr>
+        <p:blipFill>
+          <a:blip r:embed="rId2"/>
+          <a:stretch>
+            <a:fillRect/>
+          </a:stretch>
+        </p:blipFill>
+        <p:spPr>
+          <a:xfrm>
+            <a:off x="1143000" y="114300"/>
+            <a:ext cx="6780348" cy="5476875"/>
+          </a:xfrm>
+          <a:prstGeom prst="rect">
+            <a:avLst/>
+          </a:prstGeom>
+        </p:spPr>
+      </p:pic>
     </p:spTree>
     <p:extLst>
       <p:ext uri="{BB962C8B-B14F-4D97-AF65-F5344CB8AC3E}">
@@ -6993,44 +6779,30 @@
           <a:chExt cx="0" cy="0"/>
         </a:xfrm>
       </p:grpSpPr>
-      <p:sp>
-        <p:nvSpPr>
-          <p:cNvPr id="2" name="Title 1"/>
-          <p:cNvSpPr>
-            <a:spLocks noGrp="1"/>
-          </p:cNvSpPr>
-          <p:nvPr>
-            <p:ph type="title"/>
-          </p:nvPr>
-        </p:nvSpPr>
-        <p:spPr/>
-        <p:txBody>
-          <a:bodyPr/>
-          <a:lstStyle/>
-          <a:p>
-            <a:endParaRPr lang="en-US"/>
-          </a:p>
-        </p:txBody>
-      </p:sp>
-      <p:sp>
-        <p:nvSpPr>
-          <p:cNvPr id="3" name="Content Placeholder 2"/>
-          <p:cNvSpPr>
-            <a:spLocks noGrp="1"/>
-          </p:cNvSpPr>
-          <p:nvPr>
-            <p:ph sz="quarter" idx="1"/>
-          </p:nvPr>
-        </p:nvSpPr>
-        <p:spPr/>
-        <p:txBody>
-          <a:bodyPr/>
-          <a:lstStyle/>
-          <a:p>
-            <a:endParaRPr lang="en-US"/>
-          </a:p>
-        </p:txBody>
-      </p:sp>
+      <p:pic>
+        <p:nvPicPr>
+          <p:cNvPr id="4" name="Picture 3"/>
+          <p:cNvPicPr>
+            <a:picLocks noChangeAspect="1"/>
+          </p:cNvPicPr>
+          <p:nvPr/>
+        </p:nvPicPr>
+        <p:blipFill>
+          <a:blip r:embed="rId2"/>
+          <a:stretch>
+            <a:fillRect/>
+          </a:stretch>
+        </p:blipFill>
+        <p:spPr>
+          <a:xfrm>
+            <a:off x="1143000" y="190500"/>
+            <a:ext cx="6562665" cy="5276850"/>
+          </a:xfrm>
+          <a:prstGeom prst="rect">
+            <a:avLst/>
+          </a:prstGeom>
+        </p:spPr>
+      </p:pic>
     </p:spTree>
     <p:extLst>
       <p:ext uri="{BB962C8B-B14F-4D97-AF65-F5344CB8AC3E}">
@@ -7071,38 +6843,30 @@
             <p:ph type="title"/>
           </p:nvPr>
         </p:nvSpPr>
-        <p:spPr/>
-        <p:txBody>
-          <a:bodyPr/>
-          <a:lstStyle/>
-          <a:p>
-            <a:endParaRPr lang="en-US"/>
-          </a:p>
-        </p:txBody>
-      </p:sp>
-      <p:sp>
-        <p:nvSpPr>
-          <p:cNvPr id="3" name="Content Placeholder 2"/>
-          <p:cNvSpPr>
-            <a:spLocks noGrp="1"/>
-          </p:cNvSpPr>
-          <p:nvPr>
-            <p:ph sz="quarter" idx="1"/>
-          </p:nvPr>
-        </p:nvSpPr>
-        <p:spPr/>
-        <p:txBody>
-          <a:bodyPr/>
-          <a:lstStyle/>
-          <a:p>
-            <a:endParaRPr lang="en-US"/>
+        <p:spPr>
+          <a:xfrm>
+            <a:off x="914400" y="228866"/>
+            <a:ext cx="7772400" cy="723634"/>
+          </a:xfrm>
+        </p:spPr>
+        <p:txBody>
+          <a:bodyPr>
+            <a:normAutofit/>
+          </a:bodyPr>
+          <a:lstStyle/>
+          <a:p>
+            <a:r>
+              <a:rPr lang="en-US" sz="3600" dirty="0" smtClean="0"/>
+              <a:t>QA Testing</a:t>
+            </a:r>
+            <a:endParaRPr lang="en-US" sz="3600" dirty="0"/>
           </a:p>
         </p:txBody>
       </p:sp>
     </p:spTree>
     <p:extLst>
       <p:ext uri="{BB962C8B-B14F-4D97-AF65-F5344CB8AC3E}">
-        <p14:creationId xmlns:p14="http://schemas.microsoft.com/office/powerpoint/2010/main" val="147723909"/>
+        <p14:creationId xmlns:p14="http://schemas.microsoft.com/office/powerpoint/2010/main" val="1949008584"/>
       </p:ext>
     </p:extLst>
   </p:cSld>
@@ -7131,52 +6895,171 @@
       </p:grpSpPr>
       <p:sp>
         <p:nvSpPr>
-          <p:cNvPr id="2" name="Title 1"/>
-          <p:cNvSpPr>
-            <a:spLocks noGrp="1"/>
-          </p:cNvSpPr>
-          <p:nvPr>
-            <p:ph type="title"/>
-          </p:nvPr>
-        </p:nvSpPr>
-        <p:spPr/>
-        <p:txBody>
-          <a:bodyPr/>
-          <a:lstStyle/>
-          <a:p>
-            <a:endParaRPr lang="en-US"/>
-          </a:p>
-        </p:txBody>
-      </p:sp>
-      <p:sp>
-        <p:nvSpPr>
-          <p:cNvPr id="3" name="Content Placeholder 2"/>
-          <p:cNvSpPr>
-            <a:spLocks noGrp="1"/>
-          </p:cNvSpPr>
-          <p:nvPr>
-            <p:ph sz="quarter" idx="1"/>
-          </p:nvPr>
-        </p:nvSpPr>
-        <p:spPr/>
-        <p:txBody>
-          <a:bodyPr/>
-          <a:lstStyle/>
-          <a:p>
-            <a:endParaRPr lang="en-US"/>
+          <p:cNvPr id="5" name="TextBox 4"/>
+          <p:cNvSpPr txBox="1"/>
+          <p:nvPr/>
+        </p:nvSpPr>
+        <p:spPr>
+          <a:xfrm>
+            <a:off x="152400" y="4655413"/>
+            <a:ext cx="8991600" cy="584775"/>
+          </a:xfrm>
+          <a:prstGeom prst="rect">
+            <a:avLst/>
+          </a:prstGeom>
+          <a:noFill/>
+        </p:spPr>
+        <p:txBody>
+          <a:bodyPr wrap="square" rtlCol="0">
+            <a:spAutoFit/>
+          </a:bodyPr>
+          <a:lstStyle/>
+          <a:p>
+            <a:r>
+              <a:rPr lang="en-US" sz="1600" dirty="0">
+                <a:latin typeface="+mj-lt"/>
+              </a:rPr>
+              <a:t>*  All team members involved 	† - Developers and testers involved      ‡ - Business Analysts involved</a:t>
+            </a:r>
+          </a:p>
+          <a:p>
+            <a:r>
+              <a:rPr lang="en-US" sz="1600" dirty="0">
+                <a:latin typeface="+mj-lt"/>
+              </a:rPr>
+              <a:t>Milestones and tasks in </a:t>
+            </a:r>
+            <a:r>
+              <a:rPr lang="en-US" sz="1600" dirty="0">
+                <a:solidFill>
+                  <a:srgbClr val="7030A0"/>
+                </a:solidFill>
+                <a:latin typeface="+mj-lt"/>
+              </a:rPr>
+              <a:t>purple</a:t>
+            </a:r>
+            <a:r>
+              <a:rPr lang="en-US" sz="1600" dirty="0">
+                <a:latin typeface="+mj-lt"/>
+              </a:rPr>
+              <a:t> and </a:t>
+            </a:r>
+            <a:r>
+              <a:rPr lang="en-US" sz="1600" dirty="0">
+                <a:solidFill>
+                  <a:srgbClr val="002060"/>
+                </a:solidFill>
+                <a:latin typeface="+mj-lt"/>
+              </a:rPr>
+              <a:t>dark blue</a:t>
+            </a:r>
+            <a:r>
+              <a:rPr lang="en-US" sz="1600" dirty="0">
+                <a:latin typeface="+mj-lt"/>
+              </a:rPr>
+              <a:t> are complete. Remainder are in progress or in the future</a:t>
+            </a:r>
+          </a:p>
+        </p:txBody>
+      </p:sp>
+      <p:graphicFrame>
+        <p:nvGraphicFramePr>
+          <p:cNvPr id="6" name="Chart 5"/>
+          <p:cNvGraphicFramePr>
+            <a:graphicFrameLocks/>
+          </p:cNvGraphicFramePr>
+          <p:nvPr>
+            <p:extLst/>
+          </p:nvPr>
+        </p:nvGraphicFramePr>
+        <p:xfrm>
+          <a:off x="430530" y="647700"/>
+          <a:ext cx="8282940" cy="3886200"/>
+        </p:xfrm>
+        <a:graphic>
+          <a:graphicData uri="http://schemas.openxmlformats.org/drawingml/2006/chart">
+            <c:chart xmlns:c="http://schemas.openxmlformats.org/drawingml/2006/chart" xmlns:r="http://schemas.openxmlformats.org/officeDocument/2006/relationships" r:id="rId3"/>
+          </a:graphicData>
+        </a:graphic>
+      </p:graphicFrame>
+      <p:sp>
+        <p:nvSpPr>
+          <p:cNvPr id="8" name="Title 1"/>
+          <p:cNvSpPr txBox="1">
+            <a:spLocks/>
+          </p:cNvSpPr>
+          <p:nvPr/>
+        </p:nvSpPr>
+        <p:spPr>
+          <a:xfrm>
+            <a:off x="762000" y="190500"/>
+            <a:ext cx="8153400" cy="609600"/>
+          </a:xfrm>
+          <a:prstGeom prst="rect">
+            <a:avLst/>
+          </a:prstGeom>
+          <a:solidFill>
+            <a:schemeClr val="bg1"/>
+          </a:solidFill>
+        </p:spPr>
+        <p:txBody>
+          <a:bodyPr bIns="91440" anchor="b" anchorCtr="0">
+            <a:noAutofit/>
+          </a:bodyPr>
+          <a:lstStyle>
+            <a:lvl1pPr algn="l" rtl="0" eaLnBrk="1" latinLnBrk="0" hangingPunct="1">
+              <a:spcBef>
+                <a:spcPct val="0"/>
+              </a:spcBef>
+              <a:buNone/>
+              <a:defRPr kumimoji="0" sz="4000" kern="1200">
+                <a:solidFill>
+                  <a:schemeClr val="tx2"/>
+                </a:solidFill>
+                <a:latin typeface="+mj-lt"/>
+                <a:ea typeface="+mj-ea"/>
+                <a:cs typeface="+mj-cs"/>
+              </a:defRPr>
+            </a:lvl1pPr>
+          </a:lstStyle>
+          <a:p>
+            <a:r>
+              <a:rPr lang="en-US" sz="3600" dirty="0" smtClean="0"/>
+              <a:t>Updated</a:t>
+            </a:r>
+            <a:r>
+              <a:rPr lang="en-US" sz="3200" dirty="0" smtClean="0"/>
+              <a:t> Gantt Chart</a:t>
+            </a:r>
+            <a:endParaRPr lang="en-US" sz="3200" dirty="0"/>
           </a:p>
         </p:txBody>
       </p:sp>
     </p:spTree>
     <p:extLst>
       <p:ext uri="{BB962C8B-B14F-4D97-AF65-F5344CB8AC3E}">
-        <p14:creationId xmlns:p14="http://schemas.microsoft.com/office/powerpoint/2010/main" val="1949008584"/>
+        <p14:creationId xmlns:p14="http://schemas.microsoft.com/office/powerpoint/2010/main" val="1153010175"/>
       </p:ext>
     </p:extLst>
   </p:cSld>
   <p:clrMapOvr>
     <a:masterClrMapping/>
   </p:clrMapOvr>
+  <mc:AlternateContent xmlns:mc="http://schemas.openxmlformats.org/markup-compatibility/2006" xmlns:p14="http://schemas.microsoft.com/office/powerpoint/2010/main">
+    <mc:Choice Requires="p14">
+      <p:transition p14:dur="250" advTm="36883"/>
+    </mc:Choice>
+    <mc:Fallback xmlns="">
+      <p:transition advTm="36883"/>
+    </mc:Fallback>
+  </mc:AlternateContent>
+  <p:timing>
+    <p:tnLst>
+      <p:par>
+        <p:cTn id="1" dur="indefinite" restart="never" nodeType="tmRoot"/>
+      </p:par>
+    </p:tnLst>
+  </p:timing>
 </p:sld>
 </file>
 
@@ -7707,7 +7590,7 @@
   <a:extraClrSchemeLst/>
   <a:extLst>
     <a:ext uri="{05A4C25C-085E-4340-85A3-A5531E510DB2}">
-      <thm15:themeFamily xmlns="" xmlns:thm15="http://schemas.microsoft.com/office/thememl/2012/main" name="Office Theme" id="{62F939B6-93AF-4DB8-9C6B-D6C7DFDC589F}" vid="{4A3C46E8-61CC-4603-A589-7422A47A8E4A}"/>
+      <thm15:themeFamily xmlns:thm15="http://schemas.microsoft.com/office/thememl/2012/main" name="Office Theme" id="{62F939B6-93AF-4DB8-9C6B-D6C7DFDC589F}" vid="{4A3C46E8-61CC-4603-A589-7422A47A8E4A}"/>
     </a:ext>
   </a:extLst>
 </a:theme>

</xml_diff>

<commit_message>
added QA screenshot to the powerpoint
</commit_message>
<xml_diff>
--- a/Team Deliverable 3/Progress Report - FHIRed Up.pptx
+++ b/Team Deliverable 3/Progress Report - FHIRed Up.pptx
@@ -119,7 +119,7 @@
   </p:defaultTextStyle>
   <p:extLst>
     <p:ext uri="{EFAFB233-063F-42B5-8137-9DF3F51BA10A}">
-      <p15:sldGuideLst xmlns:p15="http://schemas.microsoft.com/office/powerpoint/2012/main">
+      <p15:sldGuideLst xmlns:p15="http://schemas.microsoft.com/office/powerpoint/2012/main" xmlns="">
         <p15:guide id="1" orient="horz" pos="1800" userDrawn="1">
           <p15:clr>
             <a:srgbClr val="A4A3A4"/>
@@ -133,7 +133,7 @@
       </p15:sldGuideLst>
     </p:ext>
     <p:ext uri="{2D200454-40CA-4A62-9FC3-DE9A4176ACB9}">
-      <p15:notesGuideLst xmlns:p15="http://schemas.microsoft.com/office/powerpoint/2012/main"/>
+      <p15:notesGuideLst xmlns:p15="http://schemas.microsoft.com/office/powerpoint/2012/main" xmlns=""/>
     </p:ext>
   </p:extLst>
 </p:presentation>
@@ -146,7 +146,7 @@
 </file>
 
 <file path=ppt/charts/chart1.xml><?xml version="1.0" encoding="utf-8"?>
-<c:chartSpace xmlns:c="http://schemas.openxmlformats.org/drawingml/2006/chart" xmlns:a="http://schemas.openxmlformats.org/drawingml/2006/main" xmlns:r="http://schemas.openxmlformats.org/officeDocument/2006/relationships" xmlns:c16r2="http://schemas.microsoft.com/office/drawing/2015/06/chart">
+<c:chartSpace xmlns:c="http://schemas.openxmlformats.org/drawingml/2006/chart" xmlns:a="http://schemas.openxmlformats.org/drawingml/2006/main" xmlns:r="http://schemas.openxmlformats.org/officeDocument/2006/relationships">
   <c:date1904 val="0"/>
   <c:lang val="en-US"/>
   <c:roundedCorners val="0"/>
@@ -233,7 +233,7 @@
               <c:showSerName val="1"/>
               <c:showPercent val="0"/>
               <c:showBubbleSize val="0"/>
-              <c:extLst>
+              <c:extLst xmlns:c16r2="http://schemas.microsoft.com/office/drawing/2015/06/chart">
                 <c:ext xmlns:c15="http://schemas.microsoft.com/office/drawing/2012/chart" uri="{CE6537A1-D6FC-4f65-9D91-7224C49458BB}">
                   <c15:layout/>
                 </c:ext>
@@ -245,7 +245,7 @@
             <c:dLbl>
               <c:idx val="1"/>
               <c:delete val="1"/>
-              <c:extLst>
+              <c:extLst xmlns:c16r2="http://schemas.microsoft.com/office/drawing/2015/06/chart">
                 <c:ext xmlns:c15="http://schemas.microsoft.com/office/drawing/2012/chart" uri="{CE6537A1-D6FC-4f65-9D91-7224C49458BB}"/>
                 <c:ext xmlns:c16="http://schemas.microsoft.com/office/drawing/2014/chart" uri="{C3380CC4-5D6E-409C-BE32-E72D297353CC}">
                   <c16:uniqueId val="{00000001-CBD6-47AD-B68C-CF16D1E4DC04}"/>
@@ -267,7 +267,7 @@
             <c:showPercent val="0"/>
             <c:showBubbleSize val="0"/>
             <c:showLeaderLines val="0"/>
-            <c:extLst>
+            <c:extLst xmlns:c16r2="http://schemas.microsoft.com/office/drawing/2015/06/chart">
               <c:ext xmlns:c15="http://schemas.microsoft.com/office/drawing/2012/chart" uri="{CE6537A1-D6FC-4f65-9D91-7224C49458BB}">
                 <c15:showLeaderLines val="0"/>
               </c:ext>
@@ -304,7 +304,7 @@
             </c:numRef>
           </c:yVal>
           <c:smooth val="0"/>
-          <c:extLst>
+          <c:extLst xmlns:c16r2="http://schemas.microsoft.com/office/drawing/2015/06/chart">
             <c:ext xmlns:c16="http://schemas.microsoft.com/office/drawing/2014/chart" uri="{C3380CC4-5D6E-409C-BE32-E72D297353CC}">
               <c16:uniqueId val="{00000002-CBD6-47AD-B68C-CF16D1E4DC04}"/>
             </c:ext>
@@ -373,7 +373,7 @@
               <c:showSerName val="1"/>
               <c:showPercent val="0"/>
               <c:showBubbleSize val="0"/>
-              <c:extLst>
+              <c:extLst xmlns:c16r2="http://schemas.microsoft.com/office/drawing/2015/06/chart">
                 <c:ext xmlns:c15="http://schemas.microsoft.com/office/drawing/2012/chart" uri="{CE6537A1-D6FC-4f65-9D91-7224C49458BB}">
                   <c15:layout/>
                 </c:ext>
@@ -385,7 +385,7 @@
             <c:dLbl>
               <c:idx val="1"/>
               <c:delete val="1"/>
-              <c:extLst>
+              <c:extLst xmlns:c16r2="http://schemas.microsoft.com/office/drawing/2015/06/chart">
                 <c:ext xmlns:c15="http://schemas.microsoft.com/office/drawing/2012/chart" uri="{CE6537A1-D6FC-4f65-9D91-7224C49458BB}"/>
                 <c:ext xmlns:c16="http://schemas.microsoft.com/office/drawing/2014/chart" uri="{C3380CC4-5D6E-409C-BE32-E72D297353CC}">
                   <c16:uniqueId val="{00000004-CBD6-47AD-B68C-CF16D1E4DC04}"/>
@@ -407,7 +407,7 @@
             <c:showPercent val="0"/>
             <c:showBubbleSize val="0"/>
             <c:showLeaderLines val="0"/>
-            <c:extLst>
+            <c:extLst xmlns:c16r2="http://schemas.microsoft.com/office/drawing/2015/06/chart">
               <c:ext xmlns:c15="http://schemas.microsoft.com/office/drawing/2012/chart" uri="{CE6537A1-D6FC-4f65-9D91-7224C49458BB}">
                 <c15:showLeaderLines val="0"/>
               </c:ext>
@@ -444,7 +444,7 @@
             </c:numRef>
           </c:yVal>
           <c:smooth val="0"/>
-          <c:extLst>
+          <c:extLst xmlns:c16r2="http://schemas.microsoft.com/office/drawing/2015/06/chart">
             <c:ext xmlns:c16="http://schemas.microsoft.com/office/drawing/2014/chart" uri="{C3380CC4-5D6E-409C-BE32-E72D297353CC}">
               <c16:uniqueId val="{00000005-CBD6-47AD-B68C-CF16D1E4DC04}"/>
             </c:ext>
@@ -478,7 +478,7 @@
             <c:dLbl>
               <c:idx val="0"/>
               <c:delete val="1"/>
-              <c:extLst>
+              <c:extLst xmlns:c16r2="http://schemas.microsoft.com/office/drawing/2015/06/chart">
                 <c:ext xmlns:c15="http://schemas.microsoft.com/office/drawing/2012/chart" uri="{CE6537A1-D6FC-4f65-9D91-7224C49458BB}"/>
                 <c:ext xmlns:c16="http://schemas.microsoft.com/office/drawing/2014/chart" uri="{C3380CC4-5D6E-409C-BE32-E72D297353CC}">
                   <c16:uniqueId val="{00000006-CBD6-47AD-B68C-CF16D1E4DC04}"/>
@@ -523,7 +523,7 @@
               <c:showSerName val="1"/>
               <c:showPercent val="0"/>
               <c:showBubbleSize val="0"/>
-              <c:extLst>
+              <c:extLst xmlns:c16r2="http://schemas.microsoft.com/office/drawing/2015/06/chart">
                 <c:ext xmlns:c15="http://schemas.microsoft.com/office/drawing/2012/chart" uri="{CE6537A1-D6FC-4f65-9D91-7224C49458BB}">
                   <c15:layout/>
                 </c:ext>
@@ -547,7 +547,7 @@
             <c:showPercent val="0"/>
             <c:showBubbleSize val="0"/>
             <c:showLeaderLines val="0"/>
-            <c:extLst>
+            <c:extLst xmlns:c16r2="http://schemas.microsoft.com/office/drawing/2015/06/chart">
               <c:ext xmlns:c15="http://schemas.microsoft.com/office/drawing/2012/chart" uri="{CE6537A1-D6FC-4f65-9D91-7224C49458BB}">
                 <c15:showLeaderLines val="0"/>
               </c:ext>
@@ -584,7 +584,7 @@
             </c:numRef>
           </c:yVal>
           <c:smooth val="0"/>
-          <c:extLst>
+          <c:extLst xmlns:c16r2="http://schemas.microsoft.com/office/drawing/2015/06/chart">
             <c:ext xmlns:c16="http://schemas.microsoft.com/office/drawing/2014/chart" uri="{C3380CC4-5D6E-409C-BE32-E72D297353CC}">
               <c16:uniqueId val="{00000008-CBD6-47AD-B68C-CF16D1E4DC04}"/>
             </c:ext>
@@ -653,7 +653,7 @@
               <c:showSerName val="1"/>
               <c:showPercent val="0"/>
               <c:showBubbleSize val="0"/>
-              <c:extLst>
+              <c:extLst xmlns:c16r2="http://schemas.microsoft.com/office/drawing/2015/06/chart">
                 <c:ext xmlns:c15="http://schemas.microsoft.com/office/drawing/2012/chart" uri="{CE6537A1-D6FC-4f65-9D91-7224C49458BB}">
                   <c15:layout/>
                 </c:ext>
@@ -665,7 +665,7 @@
             <c:dLbl>
               <c:idx val="1"/>
               <c:delete val="1"/>
-              <c:extLst>
+              <c:extLst xmlns:c16r2="http://schemas.microsoft.com/office/drawing/2015/06/chart">
                 <c:ext xmlns:c15="http://schemas.microsoft.com/office/drawing/2012/chart" uri="{CE6537A1-D6FC-4f65-9D91-7224C49458BB}"/>
                 <c:ext xmlns:c16="http://schemas.microsoft.com/office/drawing/2014/chart" uri="{C3380CC4-5D6E-409C-BE32-E72D297353CC}">
                   <c16:uniqueId val="{0000000A-CBD6-47AD-B68C-CF16D1E4DC04}"/>
@@ -687,7 +687,7 @@
             <c:showPercent val="0"/>
             <c:showBubbleSize val="0"/>
             <c:showLeaderLines val="0"/>
-            <c:extLst>
+            <c:extLst xmlns:c16r2="http://schemas.microsoft.com/office/drawing/2015/06/chart">
               <c:ext xmlns:c15="http://schemas.microsoft.com/office/drawing/2012/chart" uri="{CE6537A1-D6FC-4f65-9D91-7224C49458BB}">
                 <c15:showLeaderLines val="0"/>
               </c:ext>
@@ -724,7 +724,7 @@
             </c:numRef>
           </c:yVal>
           <c:smooth val="0"/>
-          <c:extLst>
+          <c:extLst xmlns:c16r2="http://schemas.microsoft.com/office/drawing/2015/06/chart">
             <c:ext xmlns:c16="http://schemas.microsoft.com/office/drawing/2014/chart" uri="{C3380CC4-5D6E-409C-BE32-E72D297353CC}">
               <c16:uniqueId val="{0000000B-CBD6-47AD-B68C-CF16D1E4DC04}"/>
             </c:ext>
@@ -793,7 +793,7 @@
               <c:showSerName val="1"/>
               <c:showPercent val="0"/>
               <c:showBubbleSize val="0"/>
-              <c:extLst>
+              <c:extLst xmlns:c16r2="http://schemas.microsoft.com/office/drawing/2015/06/chart">
                 <c:ext xmlns:c15="http://schemas.microsoft.com/office/drawing/2012/chart" uri="{CE6537A1-D6FC-4f65-9D91-7224C49458BB}">
                   <c15:layout/>
                 </c:ext>
@@ -805,7 +805,7 @@
             <c:dLbl>
               <c:idx val="1"/>
               <c:delete val="1"/>
-              <c:extLst>
+              <c:extLst xmlns:c16r2="http://schemas.microsoft.com/office/drawing/2015/06/chart">
                 <c:ext xmlns:c15="http://schemas.microsoft.com/office/drawing/2012/chart" uri="{CE6537A1-D6FC-4f65-9D91-7224C49458BB}"/>
                 <c:ext xmlns:c16="http://schemas.microsoft.com/office/drawing/2014/chart" uri="{C3380CC4-5D6E-409C-BE32-E72D297353CC}">
                   <c16:uniqueId val="{0000000D-CBD6-47AD-B68C-CF16D1E4DC04}"/>
@@ -827,7 +827,7 @@
             <c:showPercent val="0"/>
             <c:showBubbleSize val="0"/>
             <c:showLeaderLines val="0"/>
-            <c:extLst>
+            <c:extLst xmlns:c16r2="http://schemas.microsoft.com/office/drawing/2015/06/chart">
               <c:ext xmlns:c15="http://schemas.microsoft.com/office/drawing/2012/chart" uri="{CE6537A1-D6FC-4f65-9D91-7224C49458BB}">
                 <c15:showLeaderLines val="0"/>
               </c:ext>
@@ -864,7 +864,7 @@
             </c:numRef>
           </c:yVal>
           <c:smooth val="0"/>
-          <c:extLst>
+          <c:extLst xmlns:c16r2="http://schemas.microsoft.com/office/drawing/2015/06/chart">
             <c:ext xmlns:c16="http://schemas.microsoft.com/office/drawing/2014/chart" uri="{C3380CC4-5D6E-409C-BE32-E72D297353CC}">
               <c16:uniqueId val="{0000000E-CBD6-47AD-B68C-CF16D1E4DC04}"/>
             </c:ext>
@@ -898,7 +898,7 @@
             <c:dLbl>
               <c:idx val="0"/>
               <c:delete val="1"/>
-              <c:extLst>
+              <c:extLst xmlns:c16r2="http://schemas.microsoft.com/office/drawing/2015/06/chart">
                 <c:ext xmlns:c15="http://schemas.microsoft.com/office/drawing/2012/chart" uri="{CE6537A1-D6FC-4f65-9D91-7224C49458BB}"/>
                 <c:ext xmlns:c16="http://schemas.microsoft.com/office/drawing/2014/chart" uri="{C3380CC4-5D6E-409C-BE32-E72D297353CC}">
                   <c16:uniqueId val="{0000000F-CBD6-47AD-B68C-CF16D1E4DC04}"/>
@@ -938,7 +938,7 @@
               <c:showSerName val="1"/>
               <c:showPercent val="0"/>
               <c:showBubbleSize val="0"/>
-              <c:extLst>
+              <c:extLst xmlns:c16r2="http://schemas.microsoft.com/office/drawing/2015/06/chart">
                 <c:ext xmlns:c15="http://schemas.microsoft.com/office/drawing/2012/chart" uri="{CE6537A1-D6FC-4f65-9D91-7224C49458BB}">
                   <c15:layout/>
                 </c:ext>
@@ -962,7 +962,7 @@
             <c:showPercent val="0"/>
             <c:showBubbleSize val="0"/>
             <c:showLeaderLines val="0"/>
-            <c:extLst>
+            <c:extLst xmlns:c16r2="http://schemas.microsoft.com/office/drawing/2015/06/chart">
               <c:ext xmlns:c15="http://schemas.microsoft.com/office/drawing/2012/chart" uri="{CE6537A1-D6FC-4f65-9D91-7224C49458BB}">
                 <c15:showLeaderLines val="0"/>
               </c:ext>
@@ -999,7 +999,7 @@
             </c:numRef>
           </c:yVal>
           <c:smooth val="0"/>
-          <c:extLst>
+          <c:extLst xmlns:c16r2="http://schemas.microsoft.com/office/drawing/2015/06/chart">
             <c:ext xmlns:c16="http://schemas.microsoft.com/office/drawing/2014/chart" uri="{C3380CC4-5D6E-409C-BE32-E72D297353CC}">
               <c16:uniqueId val="{00000011-CBD6-47AD-B68C-CF16D1E4DC04}"/>
             </c:ext>
@@ -1072,7 +1072,7 @@
               <c:showSerName val="1"/>
               <c:showPercent val="0"/>
               <c:showBubbleSize val="0"/>
-              <c:extLst>
+              <c:extLst xmlns:c16r2="http://schemas.microsoft.com/office/drawing/2015/06/chart">
                 <c:ext xmlns:c15="http://schemas.microsoft.com/office/drawing/2012/chart" uri="{CE6537A1-D6FC-4f65-9D91-7224C49458BB}">
                   <c15:layout/>
                 </c:ext>
@@ -1084,7 +1084,7 @@
             <c:dLbl>
               <c:idx val="1"/>
               <c:delete val="1"/>
-              <c:extLst>
+              <c:extLst xmlns:c16r2="http://schemas.microsoft.com/office/drawing/2015/06/chart">
                 <c:ext xmlns:c15="http://schemas.microsoft.com/office/drawing/2012/chart" uri="{CE6537A1-D6FC-4f65-9D91-7224C49458BB}"/>
                 <c:ext xmlns:c16="http://schemas.microsoft.com/office/drawing/2014/chart" uri="{C3380CC4-5D6E-409C-BE32-E72D297353CC}">
                   <c16:uniqueId val="{00000013-CBD6-47AD-B68C-CF16D1E4DC04}"/>
@@ -1106,7 +1106,7 @@
             <c:showPercent val="0"/>
             <c:showBubbleSize val="0"/>
             <c:showLeaderLines val="0"/>
-            <c:extLst>
+            <c:extLst xmlns:c16r2="http://schemas.microsoft.com/office/drawing/2015/06/chart">
               <c:ext xmlns:c15="http://schemas.microsoft.com/office/drawing/2012/chart" uri="{CE6537A1-D6FC-4f65-9D91-7224C49458BB}">
                 <c15:showLeaderLines val="0"/>
               </c:ext>
@@ -1143,7 +1143,7 @@
             </c:numRef>
           </c:yVal>
           <c:smooth val="0"/>
-          <c:extLst>
+          <c:extLst xmlns:c16r2="http://schemas.microsoft.com/office/drawing/2015/06/chart">
             <c:ext xmlns:c16="http://schemas.microsoft.com/office/drawing/2014/chart" uri="{C3380CC4-5D6E-409C-BE32-E72D297353CC}">
               <c16:uniqueId val="{00000014-CBD6-47AD-B68C-CF16D1E4DC04}"/>
             </c:ext>
@@ -1207,7 +1207,7 @@
             </c:numRef>
           </c:yVal>
           <c:smooth val="0"/>
-          <c:extLst>
+          <c:extLst xmlns:c16r2="http://schemas.microsoft.com/office/drawing/2015/06/chart">
             <c:ext xmlns:c16="http://schemas.microsoft.com/office/drawing/2014/chart" uri="{C3380CC4-5D6E-409C-BE32-E72D297353CC}">
               <c16:uniqueId val="{00000015-CBD6-47AD-B68C-CF16D1E4DC04}"/>
             </c:ext>
@@ -1240,7 +1240,7 @@
             <c:dLbl>
               <c:idx val="0"/>
               <c:delete val="1"/>
-              <c:extLst>
+              <c:extLst xmlns:c16r2="http://schemas.microsoft.com/office/drawing/2015/06/chart">
                 <c:ext xmlns:c15="http://schemas.microsoft.com/office/drawing/2012/chart" uri="{CE6537A1-D6FC-4f65-9D91-7224C49458BB}"/>
                 <c:ext xmlns:c16="http://schemas.microsoft.com/office/drawing/2014/chart" uri="{C3380CC4-5D6E-409C-BE32-E72D297353CC}">
                   <c16:uniqueId val="{00000016-CBD6-47AD-B68C-CF16D1E4DC04}"/>
@@ -1285,7 +1285,7 @@
               <c:showSerName val="1"/>
               <c:showPercent val="0"/>
               <c:showBubbleSize val="0"/>
-              <c:extLst>
+              <c:extLst xmlns:c16r2="http://schemas.microsoft.com/office/drawing/2015/06/chart">
                 <c:ext xmlns:c15="http://schemas.microsoft.com/office/drawing/2012/chart" uri="{CE6537A1-D6FC-4f65-9D91-7224C49458BB}">
                   <c15:layout/>
                 </c:ext>
@@ -1309,7 +1309,7 @@
             <c:showPercent val="0"/>
             <c:showBubbleSize val="0"/>
             <c:showLeaderLines val="0"/>
-            <c:extLst>
+            <c:extLst xmlns:c16r2="http://schemas.microsoft.com/office/drawing/2015/06/chart">
               <c:ext xmlns:c15="http://schemas.microsoft.com/office/drawing/2012/chart" uri="{CE6537A1-D6FC-4f65-9D91-7224C49458BB}">
                 <c15:showLeaderLines val="0"/>
               </c:ext>
@@ -1346,7 +1346,7 @@
             </c:numRef>
           </c:yVal>
           <c:smooth val="0"/>
-          <c:extLst>
+          <c:extLst xmlns:c16r2="http://schemas.microsoft.com/office/drawing/2015/06/chart">
             <c:ext xmlns:c16="http://schemas.microsoft.com/office/drawing/2014/chart" uri="{C3380CC4-5D6E-409C-BE32-E72D297353CC}">
               <c16:uniqueId val="{00000018-CBD6-47AD-B68C-CF16D1E4DC04}"/>
             </c:ext>
@@ -1410,7 +1410,7 @@
             </c:numRef>
           </c:yVal>
           <c:smooth val="0"/>
-          <c:extLst>
+          <c:extLst xmlns:c16r2="http://schemas.microsoft.com/office/drawing/2015/06/chart">
             <c:ext xmlns:c16="http://schemas.microsoft.com/office/drawing/2014/chart" uri="{C3380CC4-5D6E-409C-BE32-E72D297353CC}">
               <c16:uniqueId val="{00000019-CBD6-47AD-B68C-CF16D1E4DC04}"/>
             </c:ext>
@@ -1443,7 +1443,7 @@
             <c:dLbl>
               <c:idx val="0"/>
               <c:delete val="1"/>
-              <c:extLst>
+              <c:extLst xmlns:c16r2="http://schemas.microsoft.com/office/drawing/2015/06/chart">
                 <c:ext xmlns:c15="http://schemas.microsoft.com/office/drawing/2012/chart" uri="{CE6537A1-D6FC-4f65-9D91-7224C49458BB}"/>
                 <c:ext xmlns:c16="http://schemas.microsoft.com/office/drawing/2014/chart" uri="{C3380CC4-5D6E-409C-BE32-E72D297353CC}">
                   <c16:uniqueId val="{0000001A-CBD6-47AD-B68C-CF16D1E4DC04}"/>
@@ -1488,7 +1488,7 @@
               <c:showSerName val="1"/>
               <c:showPercent val="0"/>
               <c:showBubbleSize val="0"/>
-              <c:extLst>
+              <c:extLst xmlns:c16r2="http://schemas.microsoft.com/office/drawing/2015/06/chart">
                 <c:ext xmlns:c15="http://schemas.microsoft.com/office/drawing/2012/chart" uri="{CE6537A1-D6FC-4f65-9D91-7224C49458BB}">
                   <c15:layout/>
                 </c:ext>
@@ -1512,7 +1512,7 @@
             <c:showPercent val="0"/>
             <c:showBubbleSize val="0"/>
             <c:showLeaderLines val="0"/>
-            <c:extLst>
+            <c:extLst xmlns:c16r2="http://schemas.microsoft.com/office/drawing/2015/06/chart">
               <c:ext xmlns:c15="http://schemas.microsoft.com/office/drawing/2012/chart" uri="{CE6537A1-D6FC-4f65-9D91-7224C49458BB}">
                 <c15:showLeaderLines val="0"/>
               </c:ext>
@@ -1549,7 +1549,7 @@
             </c:numRef>
           </c:yVal>
           <c:smooth val="0"/>
-          <c:extLst>
+          <c:extLst xmlns:c16r2="http://schemas.microsoft.com/office/drawing/2015/06/chart">
             <c:ext xmlns:c16="http://schemas.microsoft.com/office/drawing/2014/chart" uri="{C3380CC4-5D6E-409C-BE32-E72D297353CC}">
               <c16:uniqueId val="{0000001C-CBD6-47AD-B68C-CF16D1E4DC04}"/>
             </c:ext>
@@ -1582,7 +1582,7 @@
             <c:dLbl>
               <c:idx val="0"/>
               <c:delete val="1"/>
-              <c:extLst>
+              <c:extLst xmlns:c16r2="http://schemas.microsoft.com/office/drawing/2015/06/chart">
                 <c:ext xmlns:c15="http://schemas.microsoft.com/office/drawing/2012/chart" uri="{CE6537A1-D6FC-4f65-9D91-7224C49458BB}"/>
                 <c:ext xmlns:c16="http://schemas.microsoft.com/office/drawing/2014/chart" uri="{C3380CC4-5D6E-409C-BE32-E72D297353CC}">
                   <c16:uniqueId val="{0000001D-CBD6-47AD-B68C-CF16D1E4DC04}"/>
@@ -1627,7 +1627,7 @@
               <c:showSerName val="1"/>
               <c:showPercent val="0"/>
               <c:showBubbleSize val="0"/>
-              <c:extLst>
+              <c:extLst xmlns:c16r2="http://schemas.microsoft.com/office/drawing/2015/06/chart">
                 <c:ext xmlns:c15="http://schemas.microsoft.com/office/drawing/2012/chart" uri="{CE6537A1-D6FC-4f65-9D91-7224C49458BB}">
                   <c15:layout/>
                 </c:ext>
@@ -1651,7 +1651,7 @@
             <c:showPercent val="0"/>
             <c:showBubbleSize val="0"/>
             <c:showLeaderLines val="0"/>
-            <c:extLst>
+            <c:extLst xmlns:c16r2="http://schemas.microsoft.com/office/drawing/2015/06/chart">
               <c:ext xmlns:c15="http://schemas.microsoft.com/office/drawing/2012/chart" uri="{CE6537A1-D6FC-4f65-9D91-7224C49458BB}">
                 <c15:showLeaderLines val="0"/>
               </c:ext>
@@ -1688,7 +1688,7 @@
             </c:numRef>
           </c:yVal>
           <c:smooth val="0"/>
-          <c:extLst>
+          <c:extLst xmlns:c16r2="http://schemas.microsoft.com/office/drawing/2015/06/chart">
             <c:ext xmlns:c16="http://schemas.microsoft.com/office/drawing/2014/chart" uri="{C3380CC4-5D6E-409C-BE32-E72D297353CC}">
               <c16:uniqueId val="{0000001F-CBD6-47AD-B68C-CF16D1E4DC04}"/>
             </c:ext>
@@ -1703,11 +1703,11 @@
           <c:showPercent val="0"/>
           <c:showBubbleSize val="0"/>
         </c:dLbls>
-        <c:axId val="86713472"/>
-        <c:axId val="86714048"/>
+        <c:axId val="96871552"/>
+        <c:axId val="96872128"/>
       </c:scatterChart>
       <c:valAx>
-        <c:axId val="86713472"/>
+        <c:axId val="96871552"/>
         <c:scaling>
           <c:orientation val="minMax"/>
         </c:scaling>
@@ -1730,12 +1730,12 @@
             <a:endParaRPr lang="en-US"/>
           </a:p>
         </c:txPr>
-        <c:crossAx val="86714048"/>
+        <c:crossAx val="96872128"/>
         <c:crosses val="autoZero"/>
         <c:crossBetween val="midCat"/>
       </c:valAx>
       <c:valAx>
-        <c:axId val="86714048"/>
+        <c:axId val="96872128"/>
         <c:scaling>
           <c:orientation val="minMax"/>
         </c:scaling>
@@ -1752,7 +1752,7 @@
         <c:majorTickMark val="out"/>
         <c:minorTickMark val="none"/>
         <c:tickLblPos val="nextTo"/>
-        <c:crossAx val="86713472"/>
+        <c:crossAx val="96871552"/>
         <c:crosses val="autoZero"/>
         <c:crossBetween val="midCat"/>
       </c:valAx>
@@ -1867,7 +1867,7 @@
           <a:p>
             <a:fld id="{82AF1EC4-0AE9-4ABA-827F-84879B727577}" type="datetimeFigureOut">
               <a:rPr lang="en-US" smtClean="0"/>
-              <a:t>3/28/2016</a:t>
+              <a:t>3/31/2016</a:t>
             </a:fld>
             <a:endParaRPr lang="en-US"/>
           </a:p>
@@ -2673,7 +2673,7 @@
           <a:p>
             <a:fld id="{3EAEFB75-4DE4-4DFC-B956-52D01254B927}" type="datetimeFigureOut">
               <a:rPr lang="en-US" smtClean="0"/>
-              <a:t>3/28/2016</a:t>
+              <a:t>3/31/2016</a:t>
             </a:fld>
             <a:endParaRPr lang="en-US"/>
           </a:p>
@@ -3026,7 +3026,7 @@
           <a:p>
             <a:fld id="{3EAEFB75-4DE4-4DFC-B956-52D01254B927}" type="datetimeFigureOut">
               <a:rPr lang="en-US" smtClean="0"/>
-              <a:t>3/28/2016</a:t>
+              <a:t>3/31/2016</a:t>
             </a:fld>
             <a:endParaRPr lang="en-US"/>
           </a:p>
@@ -3201,7 +3201,7 @@
           <a:p>
             <a:fld id="{3EAEFB75-4DE4-4DFC-B956-52D01254B927}" type="datetimeFigureOut">
               <a:rPr lang="en-US" smtClean="0"/>
-              <a:t>3/28/2016</a:t>
+              <a:t>3/31/2016</a:t>
             </a:fld>
             <a:endParaRPr lang="en-US"/>
           </a:p>
@@ -3314,7 +3314,7 @@
           <a:p>
             <a:fld id="{3EAEFB75-4DE4-4DFC-B956-52D01254B927}" type="datetimeFigureOut">
               <a:rPr lang="en-US" smtClean="0"/>
-              <a:t>3/28/2016</a:t>
+              <a:t>3/31/2016</a:t>
             </a:fld>
             <a:endParaRPr lang="en-US"/>
           </a:p>
@@ -3672,7 +3672,7 @@
           <a:p>
             <a:fld id="{3EAEFB75-4DE4-4DFC-B956-52D01254B927}" type="datetimeFigureOut">
               <a:rPr lang="en-US" smtClean="0"/>
-              <a:t>3/28/2016</a:t>
+              <a:t>3/31/2016</a:t>
             </a:fld>
             <a:endParaRPr lang="en-US"/>
           </a:p>
@@ -3937,7 +3937,7 @@
           <a:p>
             <a:fld id="{3EAEFB75-4DE4-4DFC-B956-52D01254B927}" type="datetimeFigureOut">
               <a:rPr lang="en-US" smtClean="0"/>
-              <a:t>3/28/2016</a:t>
+              <a:t>3/31/2016</a:t>
             </a:fld>
             <a:endParaRPr lang="en-US"/>
           </a:p>
@@ -4299,7 +4299,7 @@
           <a:p>
             <a:fld id="{3EAEFB75-4DE4-4DFC-B956-52D01254B927}" type="datetimeFigureOut">
               <a:rPr lang="en-US" smtClean="0"/>
-              <a:t>3/28/2016</a:t>
+              <a:t>3/31/2016</a:t>
             </a:fld>
             <a:endParaRPr lang="en-US"/>
           </a:p>
@@ -4526,7 +4526,7 @@
           <a:p>
             <a:fld id="{3EAEFB75-4DE4-4DFC-B956-52D01254B927}" type="datetimeFigureOut">
               <a:rPr lang="en-US" smtClean="0"/>
-              <a:t>3/28/2016</a:t>
+              <a:t>3/31/2016</a:t>
             </a:fld>
             <a:endParaRPr lang="en-US"/>
           </a:p>
@@ -4616,7 +4616,7 @@
           <a:p>
             <a:fld id="{3EAEFB75-4DE4-4DFC-B956-52D01254B927}" type="datetimeFigureOut">
               <a:rPr lang="en-US" smtClean="0"/>
-              <a:t>3/28/2016</a:t>
+              <a:t>3/31/2016</a:t>
             </a:fld>
             <a:endParaRPr lang="en-US"/>
           </a:p>
@@ -4883,7 +4883,7 @@
           <a:p>
             <a:fld id="{3EAEFB75-4DE4-4DFC-B956-52D01254B927}" type="datetimeFigureOut">
               <a:rPr lang="en-US" smtClean="0"/>
-              <a:t>3/28/2016</a:t>
+              <a:t>3/31/2016</a:t>
             </a:fld>
             <a:endParaRPr lang="en-US"/>
           </a:p>
@@ -5111,7 +5111,7 @@
           <a:p>
             <a:fld id="{3EAEFB75-4DE4-4DFC-B956-52D01254B927}" type="datetimeFigureOut">
               <a:rPr lang="en-US" smtClean="0"/>
-              <a:t>3/28/2016</a:t>
+              <a:t>3/31/2016</a:t>
             </a:fld>
             <a:endParaRPr lang="en-US"/>
           </a:p>
@@ -5610,7 +5610,7 @@
           <a:p>
             <a:fld id="{3EAEFB75-4DE4-4DFC-B956-52D01254B927}" type="datetimeFigureOut">
               <a:rPr lang="en-US" smtClean="0"/>
-              <a:t>3/28/2016</a:t>
+              <a:t>3/31/2016</a:t>
             </a:fld>
             <a:endParaRPr lang="en-US"/>
           </a:p>
@@ -6813,6 +6813,13 @@
   <p:clrMapOvr>
     <a:masterClrMapping/>
   </p:clrMapOvr>
+  <p:timing>
+    <p:tnLst>
+      <p:par>
+        <p:cTn id="1" dur="indefinite" restart="never" nodeType="tmRoot"/>
+      </p:par>
+    </p:tnLst>
+  </p:timing>
 </p:sld>
 </file>
 
@@ -6833,33 +6840,82 @@
           <a:chExt cx="0" cy="0"/>
         </a:xfrm>
       </p:grpSpPr>
-      <p:sp>
-        <p:nvSpPr>
-          <p:cNvPr id="2" name="Title 1"/>
-          <p:cNvSpPr>
-            <a:spLocks noGrp="1"/>
-          </p:cNvSpPr>
-          <p:nvPr>
-            <p:ph type="title"/>
-          </p:nvPr>
-        </p:nvSpPr>
+      <p:pic>
+        <p:nvPicPr>
+          <p:cNvPr id="4" name="Picture 3"/>
+          <p:cNvPicPr>
+            <a:picLocks noChangeAspect="1"/>
+          </p:cNvPicPr>
+          <p:nvPr/>
+        </p:nvPicPr>
+        <p:blipFill>
+          <a:blip r:embed="rId2">
+            <a:extLst>
+              <a:ext uri="{28A0092B-C50C-407E-A947-70E740481C1C}">
+                <a14:useLocalDpi xmlns:a14="http://schemas.microsoft.com/office/drawing/2010/main" val="0"/>
+              </a:ext>
+            </a:extLst>
+          </a:blip>
+          <a:stretch>
+            <a:fillRect/>
+          </a:stretch>
+        </p:blipFill>
         <p:spPr>
           <a:xfrm>
-            <a:off x="914400" y="228866"/>
-            <a:ext cx="7772400" cy="723634"/>
+            <a:off x="152400" y="800100"/>
+            <a:ext cx="8744004" cy="4724400"/>
           </a:xfrm>
+          <a:prstGeom prst="rect">
+            <a:avLst/>
+          </a:prstGeom>
         </p:spPr>
-        <p:txBody>
-          <a:bodyPr>
-            <a:normAutofit/>
+      </p:pic>
+      <p:sp>
+        <p:nvSpPr>
+          <p:cNvPr id="6" name="Title 1"/>
+          <p:cNvSpPr txBox="1">
+            <a:spLocks/>
+          </p:cNvSpPr>
+          <p:nvPr/>
+        </p:nvSpPr>
+        <p:spPr>
+          <a:xfrm>
+            <a:off x="3219504" y="168797"/>
+            <a:ext cx="2609796" cy="609600"/>
+          </a:xfrm>
+          <a:prstGeom prst="rect">
+            <a:avLst/>
+          </a:prstGeom>
+          <a:solidFill>
+            <a:schemeClr val="bg1"/>
+          </a:solidFill>
+        </p:spPr>
+        <p:txBody>
+          <a:bodyPr bIns="91440" anchor="b" anchorCtr="0">
+            <a:noAutofit/>
           </a:bodyPr>
-          <a:lstStyle/>
+          <a:lstStyle>
+            <a:lvl1pPr algn="l" rtl="0" eaLnBrk="1" latinLnBrk="0" hangingPunct="1">
+              <a:spcBef>
+                <a:spcPct val="0"/>
+              </a:spcBef>
+              <a:buNone/>
+              <a:defRPr kumimoji="0" sz="4000" kern="1200">
+                <a:solidFill>
+                  <a:schemeClr val="tx2"/>
+                </a:solidFill>
+                <a:latin typeface="+mj-lt"/>
+                <a:ea typeface="+mj-ea"/>
+                <a:cs typeface="+mj-cs"/>
+              </a:defRPr>
+            </a:lvl1pPr>
+          </a:lstStyle>
           <a:p>
             <a:r>
               <a:rPr lang="en-US" sz="3600" dirty="0" smtClean="0"/>
               <a:t>QA Testing</a:t>
             </a:r>
-            <a:endParaRPr lang="en-US" sz="3600" dirty="0"/>
+            <a:endParaRPr lang="en-US" sz="3200" dirty="0"/>
           </a:p>
         </p:txBody>
       </p:sp>
@@ -6873,6 +6929,13 @@
   <p:clrMapOvr>
     <a:masterClrMapping/>
   </p:clrMapOvr>
+  <p:timing>
+    <p:tnLst>
+      <p:par>
+        <p:cTn id="1" dur="indefinite" restart="never" nodeType="tmRoot"/>
+      </p:par>
+    </p:tnLst>
+  </p:timing>
 </p:sld>
 </file>
 
@@ -7590,7 +7653,7 @@
   <a:extraClrSchemeLst/>
   <a:extLst>
     <a:ext uri="{05A4C25C-085E-4340-85A3-A5531E510DB2}">
-      <thm15:themeFamily xmlns:thm15="http://schemas.microsoft.com/office/thememl/2012/main" name="Office Theme" id="{62F939B6-93AF-4DB8-9C6B-D6C7DFDC589F}" vid="{4A3C46E8-61CC-4603-A589-7422A47A8E4A}"/>
+      <thm15:themeFamily xmlns:thm15="http://schemas.microsoft.com/office/thememl/2012/main" xmlns="" name="Office Theme" id="{62F939B6-93AF-4DB8-9C6B-D6C7DFDC589F}" vid="{4A3C46E8-61CC-4603-A589-7422A47A8E4A}"/>
     </a:ext>
   </a:extLst>
 </a:theme>

</xml_diff>

<commit_message>
updated Gantt chart and narration
</commit_message>
<xml_diff>
--- a/Team Deliverable 3/Progress Report - FHIRed Up.pptx
+++ b/Team Deliverable 3/Progress Report - FHIRed Up.pptx
@@ -214,13 +214,7 @@
                     </a:r>
                     <a:r>
                       <a:rPr lang="en-US" smtClean="0"/>
-                      <a:t>Scope </a:t>
-                    </a:r>
-                    <a:r>
-                      <a:rPr lang="en-US" sz="1200" b="0" i="0" u="none" strike="noStrike" baseline="0" smtClean="0">
-                        <a:effectLst/>
-                      </a:rPr>
-                      <a:t>*</a:t>
+                      <a:t>Scope*</a:t>
                     </a:r>
                     <a:endParaRPr lang="en-US"/>
                   </a:p>
@@ -233,32 +227,11 @@
               <c:showSerName val="1"/>
               <c:showPercent val="0"/>
               <c:showBubbleSize val="0"/>
-              <c:extLst xmlns:c16r2="http://schemas.microsoft.com/office/drawing/2015/06/chart">
-                <c:ext xmlns:c15="http://schemas.microsoft.com/office/drawing/2012/chart" uri="{CE6537A1-D6FC-4f65-9D91-7224C49458BB}">
-                  <c15:layout/>
-                </c:ext>
-                <c:ext xmlns:c16="http://schemas.microsoft.com/office/drawing/2014/chart" uri="{C3380CC4-5D6E-409C-BE32-E72D297353CC}">
-                  <c16:uniqueId val="{00000000-CBD6-47AD-B68C-CF16D1E4DC04}"/>
-                </c:ext>
-              </c:extLst>
             </c:dLbl>
             <c:dLbl>
               <c:idx val="1"/>
               <c:delete val="1"/>
-              <c:extLst xmlns:c16r2="http://schemas.microsoft.com/office/drawing/2015/06/chart">
-                <c:ext xmlns:c15="http://schemas.microsoft.com/office/drawing/2012/chart" uri="{CE6537A1-D6FC-4f65-9D91-7224C49458BB}"/>
-                <c:ext xmlns:c16="http://schemas.microsoft.com/office/drawing/2014/chart" uri="{C3380CC4-5D6E-409C-BE32-E72D297353CC}">
-                  <c16:uniqueId val="{00000001-CBD6-47AD-B68C-CF16D1E4DC04}"/>
-                </c:ext>
-              </c:extLst>
             </c:dLbl>
-            <c:spPr>
-              <a:noFill/>
-              <a:ln>
-                <a:noFill/>
-              </a:ln>
-              <a:effectLst/>
-            </c:spPr>
             <c:dLblPos val="t"/>
             <c:showLegendKey val="0"/>
             <c:showVal val="0"/>
@@ -267,11 +240,6 @@
             <c:showPercent val="0"/>
             <c:showBubbleSize val="0"/>
             <c:showLeaderLines val="0"/>
-            <c:extLst xmlns:c16r2="http://schemas.microsoft.com/office/drawing/2015/06/chart">
-              <c:ext xmlns:c15="http://schemas.microsoft.com/office/drawing/2012/chart" uri="{CE6537A1-D6FC-4f65-9D91-7224C49458BB}">
-                <c15:showLeaderLines val="0"/>
-              </c:ext>
-            </c:extLst>
           </c:dLbls>
           <c:xVal>
             <c:numRef>
@@ -304,11 +272,6 @@
             </c:numRef>
           </c:yVal>
           <c:smooth val="0"/>
-          <c:extLst xmlns:c16r2="http://schemas.microsoft.com/office/drawing/2015/06/chart">
-            <c:ext xmlns:c16="http://schemas.microsoft.com/office/drawing/2014/chart" uri="{C3380CC4-5D6E-409C-BE32-E72D297353CC}">
-              <c16:uniqueId val="{00000002-CBD6-47AD-B68C-CF16D1E4DC04}"/>
-            </c:ext>
-          </c:extLst>
         </c:ser>
         <c:ser>
           <c:idx val="1"/>
@@ -339,8 +302,8 @@
               <c:idx val="0"/>
               <c:layout>
                 <c:manualLayout>
-                  <c:x val="-2.688984829058284E-2"/>
-                  <c:y val="-7.0622716278112299E-2"/>
+                  <c:x val="1.297522377320136E-2"/>
+                  <c:y val="-6.0818845877626017E-2"/>
                 </c:manualLayout>
               </c:layout>
               <c:tx>
@@ -354,7 +317,7 @@
                     </a:r>
                     <a:r>
                       <a:rPr lang="en-US" dirty="0" smtClean="0"/>
-                      <a:t>Requirements </a:t>
+                      <a:t>Requirements</a:t>
                     </a:r>
                     <a:r>
                       <a:rPr lang="en-US" sz="1200" b="0" i="0" u="none" strike="noStrike" baseline="0" dirty="0" smtClean="0">
@@ -373,32 +336,11 @@
               <c:showSerName val="1"/>
               <c:showPercent val="0"/>
               <c:showBubbleSize val="0"/>
-              <c:extLst xmlns:c16r2="http://schemas.microsoft.com/office/drawing/2015/06/chart">
-                <c:ext xmlns:c15="http://schemas.microsoft.com/office/drawing/2012/chart" uri="{CE6537A1-D6FC-4f65-9D91-7224C49458BB}">
-                  <c15:layout/>
-                </c:ext>
-                <c:ext xmlns:c16="http://schemas.microsoft.com/office/drawing/2014/chart" uri="{C3380CC4-5D6E-409C-BE32-E72D297353CC}">
-                  <c16:uniqueId val="{00000003-CBD6-47AD-B68C-CF16D1E4DC04}"/>
-                </c:ext>
-              </c:extLst>
             </c:dLbl>
             <c:dLbl>
               <c:idx val="1"/>
               <c:delete val="1"/>
-              <c:extLst xmlns:c16r2="http://schemas.microsoft.com/office/drawing/2015/06/chart">
-                <c:ext xmlns:c15="http://schemas.microsoft.com/office/drawing/2012/chart" uri="{CE6537A1-D6FC-4f65-9D91-7224C49458BB}"/>
-                <c:ext xmlns:c16="http://schemas.microsoft.com/office/drawing/2014/chart" uri="{C3380CC4-5D6E-409C-BE32-E72D297353CC}">
-                  <c16:uniqueId val="{00000004-CBD6-47AD-B68C-CF16D1E4DC04}"/>
-                </c:ext>
-              </c:extLst>
             </c:dLbl>
-            <c:spPr>
-              <a:noFill/>
-              <a:ln>
-                <a:noFill/>
-              </a:ln>
-              <a:effectLst/>
-            </c:spPr>
             <c:dLblPos val="t"/>
             <c:showLegendKey val="0"/>
             <c:showVal val="0"/>
@@ -407,11 +349,6 @@
             <c:showPercent val="0"/>
             <c:showBubbleSize val="0"/>
             <c:showLeaderLines val="0"/>
-            <c:extLst xmlns:c16r2="http://schemas.microsoft.com/office/drawing/2015/06/chart">
-              <c:ext xmlns:c15="http://schemas.microsoft.com/office/drawing/2012/chart" uri="{CE6537A1-D6FC-4f65-9D91-7224C49458BB}">
-                <c15:showLeaderLines val="0"/>
-              </c:ext>
-            </c:extLst>
           </c:dLbls>
           <c:xVal>
             <c:numRef>
@@ -444,11 +381,6 @@
             </c:numRef>
           </c:yVal>
           <c:smooth val="0"/>
-          <c:extLst xmlns:c16r2="http://schemas.microsoft.com/office/drawing/2015/06/chart">
-            <c:ext xmlns:c16="http://schemas.microsoft.com/office/drawing/2014/chart" uri="{C3380CC4-5D6E-409C-BE32-E72D297353CC}">
-              <c16:uniqueId val="{00000005-CBD6-47AD-B68C-CF16D1E4DC04}"/>
-            </c:ext>
-          </c:extLst>
         </c:ser>
         <c:ser>
           <c:idx val="3"/>
@@ -459,7 +391,7 @@
               <c:strCache>
                 <c:ptCount val="1"/>
                 <c:pt idx="0">
-                  <c:v>   Design, Development, &amp; Testing in four 2-week sprints</c:v>
+                  <c:v>   Design, Development, &amp; Testing in four 2-week and 1 1-week sprints</c:v>
                 </c:pt>
               </c:strCache>
             </c:strRef>
@@ -478,19 +410,13 @@
             <c:dLbl>
               <c:idx val="0"/>
               <c:delete val="1"/>
-              <c:extLst xmlns:c16r2="http://schemas.microsoft.com/office/drawing/2015/06/chart">
-                <c:ext xmlns:c15="http://schemas.microsoft.com/office/drawing/2012/chart" uri="{CE6537A1-D6FC-4f65-9D91-7224C49458BB}"/>
-                <c:ext xmlns:c16="http://schemas.microsoft.com/office/drawing/2014/chart" uri="{C3380CC4-5D6E-409C-BE32-E72D297353CC}">
-                  <c16:uniqueId val="{00000006-CBD6-47AD-B68C-CF16D1E4DC04}"/>
-                </c:ext>
-              </c:extLst>
             </c:dLbl>
             <c:dLbl>
               <c:idx val="1"/>
               <c:layout>
                 <c:manualLayout>
-                  <c:x val="-0.12975706693517036"/>
-                  <c:y val="-8.2014049714373968E-2"/>
+                  <c:x val="-0.4502109154478966"/>
+                  <c:y val="-5.5341110298764012E-2"/>
                 </c:manualLayout>
               </c:layout>
               <c:tx>
@@ -499,18 +425,18 @@
                   <a:lstStyle/>
                   <a:p>
                     <a:r>
-                      <a:rPr lang="en-US" dirty="0"/>
-                      <a:t>   Design, Development, &amp; Testing in four 2-week </a:t>
+                      <a:rPr lang="en-US" sz="1100" dirty="0"/>
+                      <a:t>   Design, Development, &amp; Testing in four 2-week and 1 1-week </a:t>
                     </a:r>
                     <a:r>
-                      <a:rPr lang="en-US" dirty="0" smtClean="0"/>
+                      <a:rPr lang="en-US" sz="1100" dirty="0" smtClean="0"/>
                       <a:t>sprints </a:t>
                     </a:r>
                     <a:r>
-                      <a:rPr lang="en-US" sz="1200" b="0" i="0" u="none" strike="noStrike" baseline="0" dirty="0" smtClean="0">
+                      <a:rPr lang="en-US" sz="1100" b="0" i="0" u="none" strike="noStrike" baseline="0" dirty="0" smtClean="0">
                         <a:effectLst/>
                       </a:rPr>
-                      <a:t>† </a:t>
+                      <a:t>†</a:t>
                     </a:r>
                     <a:endParaRPr lang="en-US" dirty="0"/>
                   </a:p>
@@ -523,22 +449,17 @@
               <c:showSerName val="1"/>
               <c:showPercent val="0"/>
               <c:showBubbleSize val="0"/>
-              <c:extLst xmlns:c16r2="http://schemas.microsoft.com/office/drawing/2015/06/chart">
-                <c:ext xmlns:c15="http://schemas.microsoft.com/office/drawing/2012/chart" uri="{CE6537A1-D6FC-4f65-9D91-7224C49458BB}">
-                  <c15:layout/>
-                </c:ext>
-                <c:ext xmlns:c16="http://schemas.microsoft.com/office/drawing/2014/chart" uri="{C3380CC4-5D6E-409C-BE32-E72D297353CC}">
-                  <c16:uniqueId val="{00000007-CBD6-47AD-B68C-CF16D1E4DC04}"/>
-                </c:ext>
-              </c:extLst>
             </c:dLbl>
-            <c:spPr>
-              <a:noFill/>
-              <a:ln>
-                <a:noFill/>
-              </a:ln>
-              <a:effectLst/>
-            </c:spPr>
+            <c:txPr>
+              <a:bodyPr/>
+              <a:lstStyle/>
+              <a:p>
+                <a:pPr>
+                  <a:defRPr sz="1100"/>
+                </a:pPr>
+                <a:endParaRPr lang="en-US"/>
+              </a:p>
+            </c:txPr>
             <c:dLblPos val="t"/>
             <c:showLegendKey val="0"/>
             <c:showVal val="0"/>
@@ -547,11 +468,6 @@
             <c:showPercent val="0"/>
             <c:showBubbleSize val="0"/>
             <c:showLeaderLines val="0"/>
-            <c:extLst xmlns:c16r2="http://schemas.microsoft.com/office/drawing/2015/06/chart">
-              <c:ext xmlns:c15="http://schemas.microsoft.com/office/drawing/2012/chart" uri="{CE6537A1-D6FC-4f65-9D91-7224C49458BB}">
-                <c15:showLeaderLines val="0"/>
-              </c:ext>
-            </c:extLst>
           </c:dLbls>
           <c:xVal>
             <c:numRef>
@@ -560,10 +476,10 @@
                 <c:formatCode>m/d/yyyy</c:formatCode>
                 <c:ptCount val="2"/>
                 <c:pt idx="0">
-                  <c:v>42440</c:v>
+                  <c:v>42461</c:v>
                 </c:pt>
                 <c:pt idx="1">
-                  <c:v>42474</c:v>
+                  <c:v>42481</c:v>
                 </c:pt>
               </c:numCache>
             </c:numRef>
@@ -584,158 +500,13 @@
             </c:numRef>
           </c:yVal>
           <c:smooth val="0"/>
-          <c:extLst xmlns:c16r2="http://schemas.microsoft.com/office/drawing/2015/06/chart">
-            <c:ext xmlns:c16="http://schemas.microsoft.com/office/drawing/2014/chart" uri="{C3380CC4-5D6E-409C-BE32-E72D297353CC}">
-              <c16:uniqueId val="{00000008-CBD6-47AD-B68C-CF16D1E4DC04}"/>
-            </c:ext>
-          </c:extLst>
         </c:ser>
         <c:ser>
-          <c:idx val="5"/>
+          <c:idx val="7"/>
           <c:order val="3"/>
           <c:tx>
             <c:strRef>
-              <c:f>Sheet1!$A$11</c:f>
-              <c:strCache>
-                <c:ptCount val="1"/>
-                <c:pt idx="0">
-                  <c:v>   Documentation</c:v>
-                </c:pt>
-              </c:strCache>
-            </c:strRef>
-          </c:tx>
-          <c:spPr>
-            <a:ln w="50800">
-              <a:solidFill>
-                <a:srgbClr val="00B0F0"/>
-              </a:solidFill>
-            </a:ln>
-          </c:spPr>
-          <c:marker>
-            <c:symbol val="none"/>
-          </c:marker>
-          <c:dLbls>
-            <c:dLbl>
-              <c:idx val="0"/>
-              <c:layout>
-                <c:manualLayout>
-                  <c:x val="2.6659736760135951E-2"/>
-                  <c:y val="-4.1365433264966778E-2"/>
-                </c:manualLayout>
-              </c:layout>
-              <c:tx>
-                <c:rich>
-                  <a:bodyPr/>
-                  <a:lstStyle/>
-                  <a:p>
-                    <a:r>
-                      <a:rPr lang="en-US" dirty="0"/>
-                      <a:t>   </a:t>
-                    </a:r>
-                    <a:r>
-                      <a:rPr lang="en-US" dirty="0" smtClean="0"/>
-                      <a:t>Documentation </a:t>
-                    </a:r>
-                    <a:r>
-                      <a:rPr lang="en-US" sz="1200" b="0" i="0" u="none" strike="noStrike" baseline="0" dirty="0" smtClean="0">
-                        <a:effectLst/>
-                      </a:rPr>
-                      <a:t>‡</a:t>
-                    </a:r>
-                    <a:endParaRPr lang="en-US" dirty="0"/>
-                  </a:p>
-                </c:rich>
-              </c:tx>
-              <c:dLblPos val="r"/>
-              <c:showLegendKey val="0"/>
-              <c:showVal val="0"/>
-              <c:showCatName val="0"/>
-              <c:showSerName val="1"/>
-              <c:showPercent val="0"/>
-              <c:showBubbleSize val="0"/>
-              <c:extLst xmlns:c16r2="http://schemas.microsoft.com/office/drawing/2015/06/chart">
-                <c:ext xmlns:c15="http://schemas.microsoft.com/office/drawing/2012/chart" uri="{CE6537A1-D6FC-4f65-9D91-7224C49458BB}">
-                  <c15:layout/>
-                </c:ext>
-                <c:ext xmlns:c16="http://schemas.microsoft.com/office/drawing/2014/chart" uri="{C3380CC4-5D6E-409C-BE32-E72D297353CC}">
-                  <c16:uniqueId val="{00000009-CBD6-47AD-B68C-CF16D1E4DC04}"/>
-                </c:ext>
-              </c:extLst>
-            </c:dLbl>
-            <c:dLbl>
-              <c:idx val="1"/>
-              <c:delete val="1"/>
-              <c:extLst xmlns:c16r2="http://schemas.microsoft.com/office/drawing/2015/06/chart">
-                <c:ext xmlns:c15="http://schemas.microsoft.com/office/drawing/2012/chart" uri="{CE6537A1-D6FC-4f65-9D91-7224C49458BB}"/>
-                <c:ext xmlns:c16="http://schemas.microsoft.com/office/drawing/2014/chart" uri="{C3380CC4-5D6E-409C-BE32-E72D297353CC}">
-                  <c16:uniqueId val="{0000000A-CBD6-47AD-B68C-CF16D1E4DC04}"/>
-                </c:ext>
-              </c:extLst>
-            </c:dLbl>
-            <c:spPr>
-              <a:noFill/>
-              <a:ln>
-                <a:noFill/>
-              </a:ln>
-              <a:effectLst/>
-            </c:spPr>
-            <c:dLblPos val="t"/>
-            <c:showLegendKey val="0"/>
-            <c:showVal val="0"/>
-            <c:showCatName val="0"/>
-            <c:showSerName val="1"/>
-            <c:showPercent val="0"/>
-            <c:showBubbleSize val="0"/>
-            <c:showLeaderLines val="0"/>
-            <c:extLst xmlns:c16r2="http://schemas.microsoft.com/office/drawing/2015/06/chart">
-              <c:ext xmlns:c15="http://schemas.microsoft.com/office/drawing/2012/chart" uri="{CE6537A1-D6FC-4f65-9D91-7224C49458BB}">
-                <c15:showLeaderLines val="0"/>
-              </c:ext>
-            </c:extLst>
-          </c:dLbls>
-          <c:xVal>
-            <c:numRef>
-              <c:f>(Sheet1!$C$11,Sheet1!$E$11)</c:f>
-              <c:numCache>
-                <c:formatCode>m/d/yyyy</c:formatCode>
-                <c:ptCount val="2"/>
-                <c:pt idx="0">
-                  <c:v>42452</c:v>
-                </c:pt>
-                <c:pt idx="1">
-                  <c:v>42478</c:v>
-                </c:pt>
-              </c:numCache>
-            </c:numRef>
-          </c:xVal>
-          <c:yVal>
-            <c:numRef>
-              <c:f>(Sheet1!$D$11,Sheet1!$F$11)</c:f>
-              <c:numCache>
-                <c:formatCode>0.00</c:formatCode>
-                <c:ptCount val="2"/>
-                <c:pt idx="0">
-                  <c:v>3</c:v>
-                </c:pt>
-                <c:pt idx="1">
-                  <c:v>3</c:v>
-                </c:pt>
-              </c:numCache>
-            </c:numRef>
-          </c:yVal>
-          <c:smooth val="0"/>
-          <c:extLst xmlns:c16r2="http://schemas.microsoft.com/office/drawing/2015/06/chart">
-            <c:ext xmlns:c16="http://schemas.microsoft.com/office/drawing/2014/chart" uri="{C3380CC4-5D6E-409C-BE32-E72D297353CC}">
-              <c16:uniqueId val="{0000000B-CBD6-47AD-B68C-CF16D1E4DC04}"/>
-            </c:ext>
-          </c:extLst>
-        </c:ser>
-        <c:ser>
-          <c:idx val="7"/>
-          <c:order val="4"/>
-          <c:tx>
-            <c:strRef>
-              <c:f>Sheet1!$A$13</c:f>
+              <c:f>Sheet1!$A$14</c:f>
               <c:strCache>
                 <c:ptCount val="1"/>
                 <c:pt idx="0">
@@ -780,7 +551,7 @@
                       <a:rPr lang="en-US" sz="1200" b="0" i="0" u="none" strike="noStrike" baseline="0" dirty="0" smtClean="0">
                         <a:effectLst/>
                       </a:rPr>
-                      <a:t>*</a:t>
+                      <a:t>†</a:t>
                     </a:r>
                     <a:endParaRPr lang="en-US" dirty="0"/>
                   </a:p>
@@ -793,32 +564,11 @@
               <c:showSerName val="1"/>
               <c:showPercent val="0"/>
               <c:showBubbleSize val="0"/>
-              <c:extLst xmlns:c16r2="http://schemas.microsoft.com/office/drawing/2015/06/chart">
-                <c:ext xmlns:c15="http://schemas.microsoft.com/office/drawing/2012/chart" uri="{CE6537A1-D6FC-4f65-9D91-7224C49458BB}">
-                  <c15:layout/>
-                </c:ext>
-                <c:ext xmlns:c16="http://schemas.microsoft.com/office/drawing/2014/chart" uri="{C3380CC4-5D6E-409C-BE32-E72D297353CC}">
-                  <c16:uniqueId val="{0000000C-CBD6-47AD-B68C-CF16D1E4DC04}"/>
-                </c:ext>
-              </c:extLst>
             </c:dLbl>
             <c:dLbl>
               <c:idx val="1"/>
               <c:delete val="1"/>
-              <c:extLst xmlns:c16r2="http://schemas.microsoft.com/office/drawing/2015/06/chart">
-                <c:ext xmlns:c15="http://schemas.microsoft.com/office/drawing/2012/chart" uri="{CE6537A1-D6FC-4f65-9D91-7224C49458BB}"/>
-                <c:ext xmlns:c16="http://schemas.microsoft.com/office/drawing/2014/chart" uri="{C3380CC4-5D6E-409C-BE32-E72D297353CC}">
-                  <c16:uniqueId val="{0000000D-CBD6-47AD-B68C-CF16D1E4DC04}"/>
-                </c:ext>
-              </c:extLst>
             </c:dLbl>
-            <c:spPr>
-              <a:noFill/>
-              <a:ln>
-                <a:noFill/>
-              </a:ln>
-              <a:effectLst/>
-            </c:spPr>
             <c:dLblPos val="t"/>
             <c:showLegendKey val="0"/>
             <c:showVal val="0"/>
@@ -827,15 +577,10 @@
             <c:showPercent val="0"/>
             <c:showBubbleSize val="0"/>
             <c:showLeaderLines val="0"/>
-            <c:extLst xmlns:c16r2="http://schemas.microsoft.com/office/drawing/2015/06/chart">
-              <c:ext xmlns:c15="http://schemas.microsoft.com/office/drawing/2012/chart" uri="{CE6537A1-D6FC-4f65-9D91-7224C49458BB}">
-                <c15:showLeaderLines val="0"/>
-              </c:ext>
-            </c:extLst>
           </c:dLbls>
           <c:xVal>
             <c:numRef>
-              <c:f>(Sheet1!$C$13,Sheet1!$E$13)</c:f>
+              <c:f>(Sheet1!$C$14,Sheet1!$E$14)</c:f>
               <c:numCache>
                 <c:formatCode>m/d/yyyy</c:formatCode>
                 <c:ptCount val="2"/>
@@ -850,7 +595,7 @@
           </c:xVal>
           <c:yVal>
             <c:numRef>
-              <c:f>(Sheet1!$D$13,Sheet1!$F$13)</c:f>
+              <c:f>(Sheet1!$D$14,Sheet1!$F$14)</c:f>
               <c:numCache>
                 <c:formatCode>0.00</c:formatCode>
                 <c:ptCount val="2"/>
@@ -864,18 +609,13 @@
             </c:numRef>
           </c:yVal>
           <c:smooth val="0"/>
-          <c:extLst xmlns:c16r2="http://schemas.microsoft.com/office/drawing/2015/06/chart">
-            <c:ext xmlns:c16="http://schemas.microsoft.com/office/drawing/2014/chart" uri="{C3380CC4-5D6E-409C-BE32-E72D297353CC}">
-              <c16:uniqueId val="{0000000E-CBD6-47AD-B68C-CF16D1E4DC04}"/>
-            </c:ext>
-          </c:extLst>
         </c:ser>
         <c:ser>
           <c:idx val="8"/>
-          <c:order val="5"/>
+          <c:order val="4"/>
           <c:tx>
             <c:strRef>
-              <c:f>Sheet1!$A$14</c:f>
+              <c:f>Sheet1!$A$15</c:f>
               <c:strCache>
                 <c:ptCount val="1"/>
                 <c:pt idx="0">
@@ -898,12 +638,6 @@
             <c:dLbl>
               <c:idx val="0"/>
               <c:delete val="1"/>
-              <c:extLst xmlns:c16r2="http://schemas.microsoft.com/office/drawing/2015/06/chart">
-                <c:ext xmlns:c15="http://schemas.microsoft.com/office/drawing/2012/chart" uri="{CE6537A1-D6FC-4f65-9D91-7224C49458BB}"/>
-                <c:ext xmlns:c16="http://schemas.microsoft.com/office/drawing/2014/chart" uri="{C3380CC4-5D6E-409C-BE32-E72D297353CC}">
-                  <c16:uniqueId val="{0000000F-CBD6-47AD-B68C-CF16D1E4DC04}"/>
-                </c:ext>
-              </c:extLst>
             </c:dLbl>
             <c:dLbl>
               <c:idx val="1"/>
@@ -919,13 +653,7 @@
                     </a:r>
                     <a:r>
                       <a:rPr lang="en-US" smtClean="0"/>
-                      <a:t>Review </a:t>
-                    </a:r>
-                    <a:r>
-                      <a:rPr lang="en-US" sz="1200" b="0" i="0" u="none" strike="noStrike" baseline="0" smtClean="0">
-                        <a:effectLst/>
-                      </a:rPr>
-                      <a:t>*</a:t>
+                      <a:t>Review*</a:t>
                     </a:r>
                     <a:endParaRPr lang="en-US"/>
                   </a:p>
@@ -938,22 +666,7 @@
               <c:showSerName val="1"/>
               <c:showPercent val="0"/>
               <c:showBubbleSize val="0"/>
-              <c:extLst xmlns:c16r2="http://schemas.microsoft.com/office/drawing/2015/06/chart">
-                <c:ext xmlns:c15="http://schemas.microsoft.com/office/drawing/2012/chart" uri="{CE6537A1-D6FC-4f65-9D91-7224C49458BB}">
-                  <c15:layout/>
-                </c:ext>
-                <c:ext xmlns:c16="http://schemas.microsoft.com/office/drawing/2014/chart" uri="{C3380CC4-5D6E-409C-BE32-E72D297353CC}">
-                  <c16:uniqueId val="{00000010-CBD6-47AD-B68C-CF16D1E4DC04}"/>
-                </c:ext>
-              </c:extLst>
             </c:dLbl>
-            <c:spPr>
-              <a:noFill/>
-              <a:ln>
-                <a:noFill/>
-              </a:ln>
-              <a:effectLst/>
-            </c:spPr>
             <c:dLblPos val="t"/>
             <c:showLegendKey val="0"/>
             <c:showVal val="0"/>
@@ -962,15 +675,10 @@
             <c:showPercent val="0"/>
             <c:showBubbleSize val="0"/>
             <c:showLeaderLines val="0"/>
-            <c:extLst xmlns:c16r2="http://schemas.microsoft.com/office/drawing/2015/06/chart">
-              <c:ext xmlns:c15="http://schemas.microsoft.com/office/drawing/2012/chart" uri="{CE6537A1-D6FC-4f65-9D91-7224C49458BB}">
-                <c15:showLeaderLines val="0"/>
-              </c:ext>
-            </c:extLst>
           </c:dLbls>
           <c:xVal>
             <c:numRef>
-              <c:f>(Sheet1!$C$14,Sheet1!$E$14)</c:f>
+              <c:f>(Sheet1!$C$15,Sheet1!$E$15)</c:f>
               <c:numCache>
                 <c:formatCode>m/d/yyyy</c:formatCode>
                 <c:ptCount val="2"/>
@@ -985,7 +693,7 @@
           </c:xVal>
           <c:yVal>
             <c:numRef>
-              <c:f>(Sheet1!$D$14,Sheet1!$F$14)</c:f>
+              <c:f>(Sheet1!$D$15,Sheet1!$F$15)</c:f>
               <c:numCache>
                 <c:formatCode>0.00</c:formatCode>
                 <c:ptCount val="2"/>
@@ -999,18 +707,13 @@
             </c:numRef>
           </c:yVal>
           <c:smooth val="0"/>
-          <c:extLst xmlns:c16r2="http://schemas.microsoft.com/office/drawing/2015/06/chart">
-            <c:ext xmlns:c16="http://schemas.microsoft.com/office/drawing/2014/chart" uri="{C3380CC4-5D6E-409C-BE32-E72D297353CC}">
-              <c16:uniqueId val="{00000011-CBD6-47AD-B68C-CF16D1E4DC04}"/>
-            </c:ext>
-          </c:extLst>
         </c:ser>
         <c:ser>
           <c:idx val="9"/>
-          <c:order val="6"/>
+          <c:order val="5"/>
           <c:tx>
             <c:strRef>
-              <c:f>Sheet1!$A$15</c:f>
+              <c:f>Sheet1!$A$16</c:f>
               <c:strCache>
                 <c:ptCount val="1"/>
                 <c:pt idx="0">
@@ -1053,13 +756,7 @@
                     </a:r>
                     <a:r>
                       <a:rPr lang="en-US" dirty="0" smtClean="0"/>
-                      <a:t>Due </a:t>
-                    </a:r>
-                    <a:r>
-                      <a:rPr lang="en-US" sz="1200" b="0" i="0" u="none" strike="noStrike" baseline="0" dirty="0" smtClean="0">
-                        <a:effectLst/>
-                      </a:rPr>
-                      <a:t>*</a:t>
+                      <a:t>Due*</a:t>
                     </a:r>
                     <a:endParaRPr lang="en-US" dirty="0"/>
                   </a:p>
@@ -1072,32 +769,11 @@
               <c:showSerName val="1"/>
               <c:showPercent val="0"/>
               <c:showBubbleSize val="0"/>
-              <c:extLst xmlns:c16r2="http://schemas.microsoft.com/office/drawing/2015/06/chart">
-                <c:ext xmlns:c15="http://schemas.microsoft.com/office/drawing/2012/chart" uri="{CE6537A1-D6FC-4f65-9D91-7224C49458BB}">
-                  <c15:layout/>
-                </c:ext>
-                <c:ext xmlns:c16="http://schemas.microsoft.com/office/drawing/2014/chart" uri="{C3380CC4-5D6E-409C-BE32-E72D297353CC}">
-                  <c16:uniqueId val="{00000012-CBD6-47AD-B68C-CF16D1E4DC04}"/>
-                </c:ext>
-              </c:extLst>
             </c:dLbl>
             <c:dLbl>
               <c:idx val="1"/>
               <c:delete val="1"/>
-              <c:extLst xmlns:c16r2="http://schemas.microsoft.com/office/drawing/2015/06/chart">
-                <c:ext xmlns:c15="http://schemas.microsoft.com/office/drawing/2012/chart" uri="{CE6537A1-D6FC-4f65-9D91-7224C49458BB}"/>
-                <c:ext xmlns:c16="http://schemas.microsoft.com/office/drawing/2014/chart" uri="{C3380CC4-5D6E-409C-BE32-E72D297353CC}">
-                  <c16:uniqueId val="{00000013-CBD6-47AD-B68C-CF16D1E4DC04}"/>
-                </c:ext>
-              </c:extLst>
             </c:dLbl>
-            <c:spPr>
-              <a:noFill/>
-              <a:ln>
-                <a:noFill/>
-              </a:ln>
-              <a:effectLst/>
-            </c:spPr>
             <c:dLblPos val="t"/>
             <c:showLegendKey val="0"/>
             <c:showVal val="0"/>
@@ -1106,15 +782,10 @@
             <c:showPercent val="0"/>
             <c:showBubbleSize val="0"/>
             <c:showLeaderLines val="0"/>
-            <c:extLst xmlns:c16r2="http://schemas.microsoft.com/office/drawing/2015/06/chart">
-              <c:ext xmlns:c15="http://schemas.microsoft.com/office/drawing/2012/chart" uri="{CE6537A1-D6FC-4f65-9D91-7224C49458BB}">
-                <c15:showLeaderLines val="0"/>
-              </c:ext>
-            </c:extLst>
           </c:dLbls>
           <c:xVal>
             <c:numRef>
-              <c:f>(Sheet1!$C$15,Sheet1!$E$15)</c:f>
+              <c:f>(Sheet1!$C$16,Sheet1!$E$16)</c:f>
               <c:numCache>
                 <c:formatCode>m/d/yyyy</c:formatCode>
                 <c:ptCount val="2"/>
@@ -1129,7 +800,7 @@
           </c:xVal>
           <c:yVal>
             <c:numRef>
-              <c:f>(Sheet1!$D$15,Sheet1!$F$15)</c:f>
+              <c:f>(Sheet1!$D$16,Sheet1!$F$16)</c:f>
               <c:numCache>
                 <c:formatCode>0.00</c:formatCode>
                 <c:ptCount val="2"/>
@@ -1143,15 +814,10 @@
             </c:numRef>
           </c:yVal>
           <c:smooth val="0"/>
-          <c:extLst xmlns:c16r2="http://schemas.microsoft.com/office/drawing/2015/06/chart">
-            <c:ext xmlns:c16="http://schemas.microsoft.com/office/drawing/2014/chart" uri="{C3380CC4-5D6E-409C-BE32-E72D297353CC}">
-              <c16:uniqueId val="{00000014-CBD6-47AD-B68C-CF16D1E4DC04}"/>
-            </c:ext>
-          </c:extLst>
         </c:ser>
         <c:ser>
           <c:idx val="10"/>
-          <c:order val="7"/>
+          <c:order val="6"/>
           <c:tx>
             <c:strRef>
               <c:f>Sheet1!$A$6</c:f>
@@ -1186,7 +852,7 @@
                   <c:v>42418</c:v>
                 </c:pt>
                 <c:pt idx="1">
-                  <c:v>42432</c:v>
+                  <c:v>42462</c:v>
                 </c:pt>
               </c:numCache>
             </c:numRef>
@@ -1207,15 +873,10 @@
             </c:numRef>
           </c:yVal>
           <c:smooth val="0"/>
-          <c:extLst xmlns:c16r2="http://schemas.microsoft.com/office/drawing/2015/06/chart">
-            <c:ext xmlns:c16="http://schemas.microsoft.com/office/drawing/2014/chart" uri="{C3380CC4-5D6E-409C-BE32-E72D297353CC}">
-              <c16:uniqueId val="{00000015-CBD6-47AD-B68C-CF16D1E4DC04}"/>
-            </c:ext>
-          </c:extLst>
         </c:ser>
         <c:ser>
           <c:idx val="2"/>
-          <c:order val="8"/>
+          <c:order val="7"/>
           <c:tx>
             <c:strRef>
               <c:f>Sheet1!$A$7</c:f>
@@ -1240,12 +901,6 @@
             <c:dLbl>
               <c:idx val="0"/>
               <c:delete val="1"/>
-              <c:extLst xmlns:c16r2="http://schemas.microsoft.com/office/drawing/2015/06/chart">
-                <c:ext xmlns:c15="http://schemas.microsoft.com/office/drawing/2012/chart" uri="{CE6537A1-D6FC-4f65-9D91-7224C49458BB}"/>
-                <c:ext xmlns:c16="http://schemas.microsoft.com/office/drawing/2014/chart" uri="{C3380CC4-5D6E-409C-BE32-E72D297353CC}">
-                  <c16:uniqueId val="{00000016-CBD6-47AD-B68C-CF16D1E4DC04}"/>
-                </c:ext>
-              </c:extLst>
             </c:dLbl>
             <c:dLbl>
               <c:idx val="1"/>
@@ -1255,29 +910,6 @@
                   <c:y val="4.9020762297892713E-2"/>
                 </c:manualLayout>
               </c:layout>
-              <c:tx>
-                <c:rich>
-                  <a:bodyPr/>
-                  <a:lstStyle/>
-                  <a:p>
-                    <a:r>
-                      <a:rPr lang="en-US" dirty="0"/>
-                      <a:t>   Project Topic Presentation </a:t>
-                    </a:r>
-                    <a:r>
-                      <a:rPr lang="en-US" dirty="0" smtClean="0"/>
-                      <a:t>Due </a:t>
-                    </a:r>
-                    <a:r>
-                      <a:rPr lang="en-US" sz="1200" b="0" i="0" u="none" strike="noStrike" baseline="0" dirty="0" smtClean="0">
-                        <a:effectLst/>
-                      </a:rPr>
-                      <a:t>*</a:t>
-                    </a:r>
-                    <a:endParaRPr lang="en-US" dirty="0"/>
-                  </a:p>
-                </c:rich>
-              </c:tx>
               <c:dLblPos val="r"/>
               <c:showLegendKey val="0"/>
               <c:showVal val="0"/>
@@ -1285,22 +917,7 @@
               <c:showSerName val="1"/>
               <c:showPercent val="0"/>
               <c:showBubbleSize val="0"/>
-              <c:extLst xmlns:c16r2="http://schemas.microsoft.com/office/drawing/2015/06/chart">
-                <c:ext xmlns:c15="http://schemas.microsoft.com/office/drawing/2012/chart" uri="{CE6537A1-D6FC-4f65-9D91-7224C49458BB}">
-                  <c15:layout/>
-                </c:ext>
-                <c:ext xmlns:c16="http://schemas.microsoft.com/office/drawing/2014/chart" uri="{C3380CC4-5D6E-409C-BE32-E72D297353CC}">
-                  <c16:uniqueId val="{00000017-CBD6-47AD-B68C-CF16D1E4DC04}"/>
-                </c:ext>
-              </c:extLst>
             </c:dLbl>
-            <c:spPr>
-              <a:noFill/>
-              <a:ln>
-                <a:noFill/>
-              </a:ln>
-              <a:effectLst/>
-            </c:spPr>
             <c:dLblPos val="t"/>
             <c:showLegendKey val="0"/>
             <c:showVal val="0"/>
@@ -1309,11 +926,6 @@
             <c:showPercent val="0"/>
             <c:showBubbleSize val="0"/>
             <c:showLeaderLines val="0"/>
-            <c:extLst xmlns:c16r2="http://schemas.microsoft.com/office/drawing/2015/06/chart">
-              <c:ext xmlns:c15="http://schemas.microsoft.com/office/drawing/2012/chart" uri="{CE6537A1-D6FC-4f65-9D91-7224C49458BB}">
-                <c15:showLeaderLines val="0"/>
-              </c:ext>
-            </c:extLst>
           </c:dLbls>
           <c:xVal>
             <c:numRef>
@@ -1346,15 +958,10 @@
             </c:numRef>
           </c:yVal>
           <c:smooth val="0"/>
-          <c:extLst xmlns:c16r2="http://schemas.microsoft.com/office/drawing/2015/06/chart">
-            <c:ext xmlns:c16="http://schemas.microsoft.com/office/drawing/2014/chart" uri="{C3380CC4-5D6E-409C-BE32-E72D297353CC}">
-              <c16:uniqueId val="{00000018-CBD6-47AD-B68C-CF16D1E4DC04}"/>
-            </c:ext>
-          </c:extLst>
         </c:ser>
         <c:ser>
           <c:idx val="11"/>
-          <c:order val="9"/>
+          <c:order val="8"/>
           <c:tx>
             <c:strRef>
               <c:f>Sheet1!$A$9</c:f>
@@ -1389,7 +996,7 @@
                   <c:v>42425</c:v>
                 </c:pt>
                 <c:pt idx="1">
-                  <c:v>42440</c:v>
+                  <c:v>42461</c:v>
                 </c:pt>
               </c:numCache>
             </c:numRef>
@@ -1410,15 +1017,280 @@
             </c:numRef>
           </c:yVal>
           <c:smooth val="0"/>
-          <c:extLst xmlns:c16r2="http://schemas.microsoft.com/office/drawing/2015/06/chart">
-            <c:ext xmlns:c16="http://schemas.microsoft.com/office/drawing/2014/chart" uri="{C3380CC4-5D6E-409C-BE32-E72D297353CC}">
-              <c16:uniqueId val="{00000019-CBD6-47AD-B68C-CF16D1E4DC04}"/>
-            </c:ext>
-          </c:extLst>
+        </c:ser>
+        <c:ser>
+          <c:idx val="5"/>
+          <c:order val="9"/>
+          <c:tx>
+            <c:strRef>
+              <c:f>Sheet1!$A$12</c:f>
+              <c:strCache>
+                <c:ptCount val="1"/>
+                <c:pt idx="0">
+                  <c:v>   Documentation</c:v>
+                </c:pt>
+              </c:strCache>
+            </c:strRef>
+          </c:tx>
+          <c:spPr>
+            <a:ln w="50800">
+              <a:solidFill>
+                <a:srgbClr val="00B0F0"/>
+              </a:solidFill>
+            </a:ln>
+          </c:spPr>
+          <c:marker>
+            <c:symbol val="none"/>
+          </c:marker>
+          <c:dLbls>
+            <c:dLbl>
+              <c:idx val="0"/>
+              <c:layout>
+                <c:manualLayout>
+                  <c:x val="2.6659736760135951E-2"/>
+                  <c:y val="-4.1365433264966778E-2"/>
+                </c:manualLayout>
+              </c:layout>
+              <c:tx>
+                <c:rich>
+                  <a:bodyPr/>
+                  <a:lstStyle/>
+                  <a:p>
+                    <a:r>
+                      <a:rPr lang="en-US" dirty="0"/>
+                      <a:t>   </a:t>
+                    </a:r>
+                    <a:r>
+                      <a:rPr lang="en-US" dirty="0" smtClean="0"/>
+                      <a:t>Documentation</a:t>
+                    </a:r>
+                    <a:r>
+                      <a:rPr lang="en-US" sz="1200" b="0" i="0" u="none" strike="noStrike" baseline="0" dirty="0" smtClean="0">
+                        <a:effectLst/>
+                      </a:rPr>
+                      <a:t>‡</a:t>
+                    </a:r>
+                    <a:endParaRPr lang="en-US" dirty="0"/>
+                  </a:p>
+                </c:rich>
+              </c:tx>
+              <c:dLblPos val="r"/>
+              <c:showLegendKey val="0"/>
+              <c:showVal val="0"/>
+              <c:showCatName val="0"/>
+              <c:showSerName val="1"/>
+              <c:showPercent val="0"/>
+              <c:showBubbleSize val="0"/>
+            </c:dLbl>
+            <c:dLbl>
+              <c:idx val="1"/>
+              <c:delete val="1"/>
+            </c:dLbl>
+            <c:dLblPos val="t"/>
+            <c:showLegendKey val="0"/>
+            <c:showVal val="0"/>
+            <c:showCatName val="0"/>
+            <c:showSerName val="1"/>
+            <c:showPercent val="0"/>
+            <c:showBubbleSize val="0"/>
+            <c:showLeaderLines val="0"/>
+          </c:dLbls>
+          <c:xVal>
+            <c:numRef>
+              <c:f>(Sheet1!$C$12,Sheet1!$E$12)</c:f>
+              <c:numCache>
+                <c:formatCode>m/d/yyyy</c:formatCode>
+                <c:ptCount val="2"/>
+                <c:pt idx="0">
+                  <c:v>42461</c:v>
+                </c:pt>
+                <c:pt idx="1">
+                  <c:v>42478</c:v>
+                </c:pt>
+              </c:numCache>
+            </c:numRef>
+          </c:xVal>
+          <c:yVal>
+            <c:numRef>
+              <c:f>(Sheet1!$D$12,Sheet1!$F$12)</c:f>
+              <c:numCache>
+                <c:formatCode>0.00</c:formatCode>
+                <c:ptCount val="2"/>
+                <c:pt idx="0">
+                  <c:v>3</c:v>
+                </c:pt>
+                <c:pt idx="1">
+                  <c:v>3</c:v>
+                </c:pt>
+              </c:numCache>
+            </c:numRef>
+          </c:yVal>
+          <c:smooth val="0"/>
+        </c:ser>
+        <c:ser>
+          <c:idx val="12"/>
+          <c:order val="10"/>
+          <c:tx>
+            <c:strRef>
+              <c:f>Sheet1!$A$11</c:f>
+              <c:strCache>
+                <c:ptCount val="1"/>
+                <c:pt idx="0">
+                  <c:v>   Documentation</c:v>
+                </c:pt>
+              </c:strCache>
+            </c:strRef>
+          </c:tx>
+          <c:spPr>
+            <a:ln w="50800">
+              <a:solidFill>
+                <a:srgbClr val="7030A0"/>
+              </a:solidFill>
+            </a:ln>
+          </c:spPr>
+          <c:marker>
+            <c:symbol val="none"/>
+          </c:marker>
+          <c:dLbls>
+            <c:delete val="1"/>
+          </c:dLbls>
+          <c:xVal>
+            <c:numRef>
+              <c:f>(Sheet1!$C$11,Sheet1!$E$11)</c:f>
+              <c:numCache>
+                <c:formatCode>m/d/yyyy</c:formatCode>
+                <c:ptCount val="2"/>
+                <c:pt idx="0">
+                  <c:v>42452</c:v>
+                </c:pt>
+                <c:pt idx="1">
+                  <c:v>42471</c:v>
+                </c:pt>
+              </c:numCache>
+            </c:numRef>
+          </c:xVal>
+          <c:yVal>
+            <c:numRef>
+              <c:f>(Sheet1!$D$11,Sheet1!$F$11)</c:f>
+              <c:numCache>
+                <c:formatCode>0.00</c:formatCode>
+                <c:ptCount val="2"/>
+                <c:pt idx="0">
+                  <c:v>3</c:v>
+                </c:pt>
+                <c:pt idx="1">
+                  <c:v>3</c:v>
+                </c:pt>
+              </c:numCache>
+            </c:numRef>
+          </c:yVal>
+          <c:smooth val="0"/>
+        </c:ser>
+        <c:ser>
+          <c:idx val="6"/>
+          <c:order val="11"/>
+          <c:tx>
+            <c:strRef>
+              <c:f>Sheet1!$A$13</c:f>
+              <c:strCache>
+                <c:ptCount val="1"/>
+                <c:pt idx="0">
+                  <c:v>   Project Progress Report Due</c:v>
+                </c:pt>
+              </c:strCache>
+            </c:strRef>
+          </c:tx>
+          <c:marker>
+            <c:symbol val="diamond"/>
+            <c:size val="11"/>
+            <c:spPr>
+              <a:solidFill>
+                <a:srgbClr val="002060"/>
+              </a:solidFill>
+            </c:spPr>
+          </c:marker>
+          <c:dLbls>
+            <c:dLbl>
+              <c:idx val="0"/>
+              <c:delete val="1"/>
+            </c:dLbl>
+            <c:dLbl>
+              <c:idx val="1"/>
+              <c:layout>
+                <c:manualLayout>
+                  <c:x val="-0.10157564826015883"/>
+                  <c:y val="4.4187055262310197E-2"/>
+                </c:manualLayout>
+              </c:layout>
+              <c:tx>
+                <c:rich>
+                  <a:bodyPr/>
+                  <a:lstStyle/>
+                  <a:p>
+                    <a:r>
+                      <a:rPr lang="en-US" dirty="0"/>
+                      <a:t>   Project Progress Report </a:t>
+                    </a:r>
+                    <a:r>
+                      <a:rPr lang="en-US" dirty="0" smtClean="0"/>
+                      <a:t>Due*</a:t>
+                    </a:r>
+                    <a:endParaRPr lang="en-US" dirty="0"/>
+                  </a:p>
+                </c:rich>
+              </c:tx>
+              <c:dLblPos val="r"/>
+              <c:showLegendKey val="0"/>
+              <c:showVal val="0"/>
+              <c:showCatName val="0"/>
+              <c:showSerName val="1"/>
+              <c:showPercent val="0"/>
+              <c:showBubbleSize val="0"/>
+            </c:dLbl>
+            <c:dLblPos val="t"/>
+            <c:showLegendKey val="0"/>
+            <c:showVal val="0"/>
+            <c:showCatName val="0"/>
+            <c:showSerName val="1"/>
+            <c:showPercent val="0"/>
+            <c:showBubbleSize val="0"/>
+            <c:showLeaderLines val="0"/>
+          </c:dLbls>
+          <c:xVal>
+            <c:numRef>
+              <c:f>(Sheet1!$C$13,Sheet1!$E$13)</c:f>
+              <c:numCache>
+                <c:formatCode>m/d/yyyy</c:formatCode>
+                <c:ptCount val="2"/>
+                <c:pt idx="0">
+                  <c:v>42471</c:v>
+                </c:pt>
+                <c:pt idx="1">
+                  <c:v>42471</c:v>
+                </c:pt>
+              </c:numCache>
+            </c:numRef>
+          </c:xVal>
+          <c:yVal>
+            <c:numRef>
+              <c:f>(Sheet1!$D$13,Sheet1!$F$13)</c:f>
+              <c:numCache>
+                <c:formatCode>0.00</c:formatCode>
+                <c:ptCount val="2"/>
+                <c:pt idx="0">
+                  <c:v>3</c:v>
+                </c:pt>
+                <c:pt idx="1">
+                  <c:v>3</c:v>
+                </c:pt>
+              </c:numCache>
+            </c:numRef>
+          </c:yVal>
+          <c:smooth val="0"/>
         </c:ser>
         <c:ser>
           <c:idx val="4"/>
-          <c:order val="10"/>
+          <c:order val="12"/>
           <c:tx>
             <c:strRef>
               <c:f>Sheet1!$A$10</c:f>
@@ -1443,19 +1315,13 @@
             <c:dLbl>
               <c:idx val="0"/>
               <c:delete val="1"/>
-              <c:extLst xmlns:c16r2="http://schemas.microsoft.com/office/drawing/2015/06/chart">
-                <c:ext xmlns:c15="http://schemas.microsoft.com/office/drawing/2012/chart" uri="{CE6537A1-D6FC-4f65-9D91-7224C49458BB}"/>
-                <c:ext xmlns:c16="http://schemas.microsoft.com/office/drawing/2014/chart" uri="{C3380CC4-5D6E-409C-BE32-E72D297353CC}">
-                  <c16:uniqueId val="{0000001A-CBD6-47AD-B68C-CF16D1E4DC04}"/>
-                </c:ext>
-              </c:extLst>
             </c:dLbl>
             <c:dLbl>
               <c:idx val="1"/>
               <c:layout>
                 <c:manualLayout>
                   <c:x val="-8.3176384230719977E-2"/>
-                  <c:y val="8.7084555607019706E-2"/>
+                  <c:y val="5.2833703717916965E-2"/>
                 </c:manualLayout>
               </c:layout>
               <c:tx>
@@ -1469,13 +1335,7 @@
                     </a:r>
                     <a:r>
                       <a:rPr lang="en-US" dirty="0" smtClean="0"/>
-                      <a:t>Due </a:t>
-                    </a:r>
-                    <a:r>
-                      <a:rPr lang="en-US" sz="1200" b="0" i="0" u="none" strike="noStrike" baseline="0" dirty="0" smtClean="0">
-                        <a:effectLst/>
-                      </a:rPr>
-                      <a:t>*</a:t>
+                      <a:t>Due*</a:t>
                     </a:r>
                     <a:endParaRPr lang="en-US" dirty="0"/>
                   </a:p>
@@ -1488,22 +1348,7 @@
               <c:showSerName val="1"/>
               <c:showPercent val="0"/>
               <c:showBubbleSize val="0"/>
-              <c:extLst xmlns:c16r2="http://schemas.microsoft.com/office/drawing/2015/06/chart">
-                <c:ext xmlns:c15="http://schemas.microsoft.com/office/drawing/2012/chart" uri="{CE6537A1-D6FC-4f65-9D91-7224C49458BB}">
-                  <c15:layout/>
-                </c:ext>
-                <c:ext xmlns:c16="http://schemas.microsoft.com/office/drawing/2014/chart" uri="{C3380CC4-5D6E-409C-BE32-E72D297353CC}">
-                  <c16:uniqueId val="{0000001B-CBD6-47AD-B68C-CF16D1E4DC04}"/>
-                </c:ext>
-              </c:extLst>
             </c:dLbl>
-            <c:spPr>
-              <a:noFill/>
-              <a:ln>
-                <a:noFill/>
-              </a:ln>
-              <a:effectLst/>
-            </c:spPr>
             <c:dLblPos val="t"/>
             <c:showLegendKey val="0"/>
             <c:showVal val="0"/>
@@ -1512,11 +1357,6 @@
             <c:showPercent val="0"/>
             <c:showBubbleSize val="0"/>
             <c:showLeaderLines val="0"/>
-            <c:extLst xmlns:c16r2="http://schemas.microsoft.com/office/drawing/2015/06/chart">
-              <c:ext xmlns:c15="http://schemas.microsoft.com/office/drawing/2012/chart" uri="{CE6537A1-D6FC-4f65-9D91-7224C49458BB}">
-                <c15:showLeaderLines val="0"/>
-              </c:ext>
-            </c:extLst>
           </c:dLbls>
           <c:xVal>
             <c:numRef>
@@ -1549,150 +1389,6 @@
             </c:numRef>
           </c:yVal>
           <c:smooth val="0"/>
-          <c:extLst xmlns:c16r2="http://schemas.microsoft.com/office/drawing/2015/06/chart">
-            <c:ext xmlns:c16="http://schemas.microsoft.com/office/drawing/2014/chart" uri="{C3380CC4-5D6E-409C-BE32-E72D297353CC}">
-              <c16:uniqueId val="{0000001C-CBD6-47AD-B68C-CF16D1E4DC04}"/>
-            </c:ext>
-          </c:extLst>
-        </c:ser>
-        <c:ser>
-          <c:idx val="6"/>
-          <c:order val="11"/>
-          <c:tx>
-            <c:strRef>
-              <c:f>Sheet1!$A$12</c:f>
-              <c:strCache>
-                <c:ptCount val="1"/>
-                <c:pt idx="0">
-                  <c:v>   Project Progress Report Due</c:v>
-                </c:pt>
-              </c:strCache>
-            </c:strRef>
-          </c:tx>
-          <c:marker>
-            <c:symbol val="diamond"/>
-            <c:size val="9"/>
-            <c:spPr>
-              <a:solidFill>
-                <a:srgbClr val="00B050"/>
-              </a:solidFill>
-            </c:spPr>
-          </c:marker>
-          <c:dLbls>
-            <c:dLbl>
-              <c:idx val="0"/>
-              <c:delete val="1"/>
-              <c:extLst xmlns:c16r2="http://schemas.microsoft.com/office/drawing/2015/06/chart">
-                <c:ext xmlns:c15="http://schemas.microsoft.com/office/drawing/2012/chart" uri="{CE6537A1-D6FC-4f65-9D91-7224C49458BB}"/>
-                <c:ext xmlns:c16="http://schemas.microsoft.com/office/drawing/2014/chart" uri="{C3380CC4-5D6E-409C-BE32-E72D297353CC}">
-                  <c16:uniqueId val="{0000001D-CBD6-47AD-B68C-CF16D1E4DC04}"/>
-                </c:ext>
-              </c:extLst>
-            </c:dLbl>
-            <c:dLbl>
-              <c:idx val="1"/>
-              <c:layout>
-                <c:manualLayout>
-                  <c:x val="-8.6243048965705407E-2"/>
-                  <c:y val="7.1273223200041175E-2"/>
-                </c:manualLayout>
-              </c:layout>
-              <c:tx>
-                <c:rich>
-                  <a:bodyPr/>
-                  <a:lstStyle/>
-                  <a:p>
-                    <a:r>
-                      <a:rPr lang="en-US" dirty="0"/>
-                      <a:t>   Project Progress Report </a:t>
-                    </a:r>
-                    <a:r>
-                      <a:rPr lang="en-US" dirty="0" smtClean="0"/>
-                      <a:t>Due </a:t>
-                    </a:r>
-                    <a:r>
-                      <a:rPr lang="en-US" sz="1200" b="0" i="0" u="none" strike="noStrike" baseline="0" dirty="0" smtClean="0">
-                        <a:effectLst/>
-                      </a:rPr>
-                      <a:t>*</a:t>
-                    </a:r>
-                    <a:endParaRPr lang="en-US" dirty="0"/>
-                  </a:p>
-                </c:rich>
-              </c:tx>
-              <c:dLblPos val="r"/>
-              <c:showLegendKey val="0"/>
-              <c:showVal val="0"/>
-              <c:showCatName val="0"/>
-              <c:showSerName val="1"/>
-              <c:showPercent val="0"/>
-              <c:showBubbleSize val="0"/>
-              <c:extLst xmlns:c16r2="http://schemas.microsoft.com/office/drawing/2015/06/chart">
-                <c:ext xmlns:c15="http://schemas.microsoft.com/office/drawing/2012/chart" uri="{CE6537A1-D6FC-4f65-9D91-7224C49458BB}">
-                  <c15:layout/>
-                </c:ext>
-                <c:ext xmlns:c16="http://schemas.microsoft.com/office/drawing/2014/chart" uri="{C3380CC4-5D6E-409C-BE32-E72D297353CC}">
-                  <c16:uniqueId val="{0000001E-CBD6-47AD-B68C-CF16D1E4DC04}"/>
-                </c:ext>
-              </c:extLst>
-            </c:dLbl>
-            <c:spPr>
-              <a:noFill/>
-              <a:ln>
-                <a:noFill/>
-              </a:ln>
-              <a:effectLst/>
-            </c:spPr>
-            <c:dLblPos val="t"/>
-            <c:showLegendKey val="0"/>
-            <c:showVal val="0"/>
-            <c:showCatName val="0"/>
-            <c:showSerName val="1"/>
-            <c:showPercent val="0"/>
-            <c:showBubbleSize val="0"/>
-            <c:showLeaderLines val="0"/>
-            <c:extLst xmlns:c16r2="http://schemas.microsoft.com/office/drawing/2015/06/chart">
-              <c:ext xmlns:c15="http://schemas.microsoft.com/office/drawing/2012/chart" uri="{CE6537A1-D6FC-4f65-9D91-7224C49458BB}">
-                <c15:showLeaderLines val="0"/>
-              </c:ext>
-            </c:extLst>
-          </c:dLbls>
-          <c:xVal>
-            <c:numRef>
-              <c:f>(Sheet1!$C$12,Sheet1!$E$12)</c:f>
-              <c:numCache>
-                <c:formatCode>m/d/yyyy</c:formatCode>
-                <c:ptCount val="2"/>
-                <c:pt idx="0">
-                  <c:v>42463</c:v>
-                </c:pt>
-                <c:pt idx="1">
-                  <c:v>42463</c:v>
-                </c:pt>
-              </c:numCache>
-            </c:numRef>
-          </c:xVal>
-          <c:yVal>
-            <c:numRef>
-              <c:f>(Sheet1!$D$12,Sheet1!$F$12)</c:f>
-              <c:numCache>
-                <c:formatCode>0.00</c:formatCode>
-                <c:ptCount val="2"/>
-                <c:pt idx="0">
-                  <c:v>3</c:v>
-                </c:pt>
-                <c:pt idx="1">
-                  <c:v>3</c:v>
-                </c:pt>
-              </c:numCache>
-            </c:numRef>
-          </c:yVal>
-          <c:smooth val="0"/>
-          <c:extLst xmlns:c16r2="http://schemas.microsoft.com/office/drawing/2015/06/chart">
-            <c:ext xmlns:c16="http://schemas.microsoft.com/office/drawing/2014/chart" uri="{C3380CC4-5D6E-409C-BE32-E72D297353CC}">
-              <c16:uniqueId val="{0000001F-CBD6-47AD-B68C-CF16D1E4DC04}"/>
-            </c:ext>
-          </c:extLst>
         </c:ser>
         <c:dLbls>
           <c:dLblPos val="t"/>
@@ -1703,11 +1399,11 @@
           <c:showPercent val="0"/>
           <c:showBubbleSize val="0"/>
         </c:dLbls>
-        <c:axId val="96871552"/>
-        <c:axId val="96872128"/>
+        <c:axId val="133444096"/>
+        <c:axId val="133445824"/>
       </c:scatterChart>
       <c:valAx>
-        <c:axId val="96871552"/>
+        <c:axId val="133444096"/>
         <c:scaling>
           <c:orientation val="minMax"/>
         </c:scaling>
@@ -1725,17 +1421,17 @@
           <a:lstStyle/>
           <a:p>
             <a:pPr>
-              <a:defRPr sz="900"/>
+              <a:defRPr/>
             </a:pPr>
             <a:endParaRPr lang="en-US"/>
           </a:p>
         </c:txPr>
-        <c:crossAx val="96872128"/>
+        <c:crossAx val="133445824"/>
         <c:crosses val="autoZero"/>
         <c:crossBetween val="midCat"/>
       </c:valAx>
       <c:valAx>
-        <c:axId val="96872128"/>
+        <c:axId val="133445824"/>
         <c:scaling>
           <c:orientation val="minMax"/>
         </c:scaling>
@@ -1752,7 +1448,7 @@
         <c:majorTickMark val="out"/>
         <c:minorTickMark val="none"/>
         <c:tickLblPos val="nextTo"/>
-        <c:crossAx val="96871552"/>
+        <c:crossAx val="133444096"/>
         <c:crosses val="autoZero"/>
         <c:crossBetween val="midCat"/>
       </c:valAx>
@@ -1772,9 +1468,7 @@
     <a:lstStyle/>
     <a:p>
       <a:pPr>
-        <a:defRPr sz="1200">
-          <a:latin typeface="+mj-lt"/>
-        </a:defRPr>
+        <a:defRPr sz="1200"/>
       </a:pPr>
       <a:endParaRPr lang="en-US"/>
     </a:p>
@@ -1867,7 +1561,7 @@
           <a:p>
             <a:fld id="{82AF1EC4-0AE9-4ABA-827F-84879B727577}" type="datetimeFigureOut">
               <a:rPr lang="en-US" smtClean="0"/>
-              <a:t>3/31/2016</a:t>
+              <a:t>4/1/2016</a:t>
             </a:fld>
             <a:endParaRPr lang="en-US"/>
           </a:p>
@@ -2265,13 +1959,79 @@
           <a:p>
             <a:r>
               <a:rPr lang="en-US" dirty="0" smtClean="0"/>
-              <a:t>Must</a:t>
+              <a:t>Items</a:t>
             </a:r>
             <a:r>
               <a:rPr lang="en-US" baseline="0" dirty="0" smtClean="0"/>
-              <a:t> Update the Image</a:t>
-            </a:r>
-            <a:endParaRPr lang="en-US" dirty="0"/>
+              <a:t> to discuss:</a:t>
+            </a:r>
+          </a:p>
+          <a:p>
+            <a:r>
+              <a:rPr lang="en-US" baseline="0" dirty="0" smtClean="0"/>
+              <a:t>This slide presents an updated Gantt chart</a:t>
+            </a:r>
+          </a:p>
+          <a:p>
+            <a:r>
+              <a:rPr lang="en-US" baseline="0" dirty="0" smtClean="0"/>
+              <a:t> </a:t>
+            </a:r>
+          </a:p>
+          <a:p>
+            <a:r>
+              <a:rPr lang="en-US" baseline="0" dirty="0" smtClean="0"/>
+              <a:t>Scope is set until we ensure we make the most of its current reach.</a:t>
+            </a:r>
+          </a:p>
+          <a:p>
+            <a:endParaRPr lang="en-US" baseline="0" dirty="0" smtClean="0"/>
+          </a:p>
+          <a:p>
+            <a:r>
+              <a:rPr lang="en-US" baseline="0" dirty="0" smtClean="0"/>
+              <a:t>The 3  2-week sprints are complete thanks to Augusto, Spiro, and Anja. The 4</a:t>
+            </a:r>
+            <a:r>
+              <a:rPr lang="en-US" baseline="30000" dirty="0" smtClean="0"/>
+              <a:t>th</a:t>
+            </a:r>
+            <a:r>
+              <a:rPr lang="en-US" baseline="0" dirty="0" smtClean="0"/>
+              <a:t> is underway with a final 1 week spring to correct any remaining bugs. </a:t>
+            </a:r>
+          </a:p>
+          <a:p>
+            <a:endParaRPr lang="en-US" baseline="0" dirty="0" smtClean="0"/>
+          </a:p>
+          <a:p>
+            <a:r>
+              <a:rPr lang="en-US" baseline="0" dirty="0" smtClean="0"/>
+              <a:t>Analysis is complete </a:t>
+            </a:r>
+          </a:p>
+          <a:p>
+            <a:r>
+              <a:rPr lang="en-US" baseline="0" dirty="0" smtClean="0"/>
+              <a:t>Code testing is occurring on a continual basis by Dan and other team members.</a:t>
+            </a:r>
+          </a:p>
+          <a:p>
+            <a:r>
+              <a:rPr lang="en-US" baseline="0" dirty="0" smtClean="0"/>
+              <a:t>Documentation has started and will be completed a week after the 4</a:t>
+            </a:r>
+            <a:r>
+              <a:rPr lang="en-US" baseline="30000" dirty="0" smtClean="0"/>
+              <a:t>th</a:t>
+            </a:r>
+            <a:r>
+              <a:rPr lang="en-US" baseline="0" dirty="0" smtClean="0"/>
+              <a:t> sprint.</a:t>
+            </a:r>
+          </a:p>
+          <a:p>
+            <a:endParaRPr lang="en-US" dirty="0" smtClean="0"/>
           </a:p>
         </p:txBody>
       </p:sp>
@@ -2673,7 +2433,7 @@
           <a:p>
             <a:fld id="{3EAEFB75-4DE4-4DFC-B956-52D01254B927}" type="datetimeFigureOut">
               <a:rPr lang="en-US" smtClean="0"/>
-              <a:t>3/31/2016</a:t>
+              <a:t>4/1/2016</a:t>
             </a:fld>
             <a:endParaRPr lang="en-US"/>
           </a:p>
@@ -3026,7 +2786,7 @@
           <a:p>
             <a:fld id="{3EAEFB75-4DE4-4DFC-B956-52D01254B927}" type="datetimeFigureOut">
               <a:rPr lang="en-US" smtClean="0"/>
-              <a:t>3/31/2016</a:t>
+              <a:t>4/1/2016</a:t>
             </a:fld>
             <a:endParaRPr lang="en-US"/>
           </a:p>
@@ -3201,7 +2961,7 @@
           <a:p>
             <a:fld id="{3EAEFB75-4DE4-4DFC-B956-52D01254B927}" type="datetimeFigureOut">
               <a:rPr lang="en-US" smtClean="0"/>
-              <a:t>3/31/2016</a:t>
+              <a:t>4/1/2016</a:t>
             </a:fld>
             <a:endParaRPr lang="en-US"/>
           </a:p>
@@ -3314,7 +3074,7 @@
           <a:p>
             <a:fld id="{3EAEFB75-4DE4-4DFC-B956-52D01254B927}" type="datetimeFigureOut">
               <a:rPr lang="en-US" smtClean="0"/>
-              <a:t>3/31/2016</a:t>
+              <a:t>4/1/2016</a:t>
             </a:fld>
             <a:endParaRPr lang="en-US"/>
           </a:p>
@@ -3672,7 +3432,7 @@
           <a:p>
             <a:fld id="{3EAEFB75-4DE4-4DFC-B956-52D01254B927}" type="datetimeFigureOut">
               <a:rPr lang="en-US" smtClean="0"/>
-              <a:t>3/31/2016</a:t>
+              <a:t>4/1/2016</a:t>
             </a:fld>
             <a:endParaRPr lang="en-US"/>
           </a:p>
@@ -3937,7 +3697,7 @@
           <a:p>
             <a:fld id="{3EAEFB75-4DE4-4DFC-B956-52D01254B927}" type="datetimeFigureOut">
               <a:rPr lang="en-US" smtClean="0"/>
-              <a:t>3/31/2016</a:t>
+              <a:t>4/1/2016</a:t>
             </a:fld>
             <a:endParaRPr lang="en-US"/>
           </a:p>
@@ -4299,7 +4059,7 @@
           <a:p>
             <a:fld id="{3EAEFB75-4DE4-4DFC-B956-52D01254B927}" type="datetimeFigureOut">
               <a:rPr lang="en-US" smtClean="0"/>
-              <a:t>3/31/2016</a:t>
+              <a:t>4/1/2016</a:t>
             </a:fld>
             <a:endParaRPr lang="en-US"/>
           </a:p>
@@ -4526,7 +4286,7 @@
           <a:p>
             <a:fld id="{3EAEFB75-4DE4-4DFC-B956-52D01254B927}" type="datetimeFigureOut">
               <a:rPr lang="en-US" smtClean="0"/>
-              <a:t>3/31/2016</a:t>
+              <a:t>4/1/2016</a:t>
             </a:fld>
             <a:endParaRPr lang="en-US"/>
           </a:p>
@@ -4616,7 +4376,7 @@
           <a:p>
             <a:fld id="{3EAEFB75-4DE4-4DFC-B956-52D01254B927}" type="datetimeFigureOut">
               <a:rPr lang="en-US" smtClean="0"/>
-              <a:t>3/31/2016</a:t>
+              <a:t>4/1/2016</a:t>
             </a:fld>
             <a:endParaRPr lang="en-US"/>
           </a:p>
@@ -4883,7 +4643,7 @@
           <a:p>
             <a:fld id="{3EAEFB75-4DE4-4DFC-B956-52D01254B927}" type="datetimeFigureOut">
               <a:rPr lang="en-US" smtClean="0"/>
-              <a:t>3/31/2016</a:t>
+              <a:t>4/1/2016</a:t>
             </a:fld>
             <a:endParaRPr lang="en-US"/>
           </a:p>
@@ -5111,7 +4871,7 @@
           <a:p>
             <a:fld id="{3EAEFB75-4DE4-4DFC-B956-52D01254B927}" type="datetimeFigureOut">
               <a:rPr lang="en-US" smtClean="0"/>
-              <a:t>3/31/2016</a:t>
+              <a:t>4/1/2016</a:t>
             </a:fld>
             <a:endParaRPr lang="en-US"/>
           </a:p>
@@ -5610,7 +5370,7 @@
           <a:p>
             <a:fld id="{3EAEFB75-4DE4-4DFC-B956-52D01254B927}" type="datetimeFigureOut">
               <a:rPr lang="en-US" smtClean="0"/>
-              <a:t>3/31/2016</a:t>
+              <a:t>4/1/2016</a:t>
             </a:fld>
             <a:endParaRPr lang="en-US"/>
           </a:p>
@@ -6964,7 +6724,7 @@
         </p:nvSpPr>
         <p:spPr>
           <a:xfrm>
-            <a:off x="152400" y="4655413"/>
+            <a:off x="152400" y="4947800"/>
             <a:ext cx="8991600" cy="584775"/>
           </a:xfrm>
           <a:prstGeom prst="rect">
@@ -7025,26 +6785,6 @@
           </a:p>
         </p:txBody>
       </p:sp>
-      <p:graphicFrame>
-        <p:nvGraphicFramePr>
-          <p:cNvPr id="6" name="Chart 5"/>
-          <p:cNvGraphicFramePr>
-            <a:graphicFrameLocks/>
-          </p:cNvGraphicFramePr>
-          <p:nvPr>
-            <p:extLst/>
-          </p:nvPr>
-        </p:nvGraphicFramePr>
-        <p:xfrm>
-          <a:off x="430530" y="647700"/>
-          <a:ext cx="8282940" cy="3886200"/>
-        </p:xfrm>
-        <a:graphic>
-          <a:graphicData uri="http://schemas.openxmlformats.org/drawingml/2006/chart">
-            <c:chart xmlns:c="http://schemas.openxmlformats.org/drawingml/2006/chart" xmlns:r="http://schemas.openxmlformats.org/officeDocument/2006/relationships" r:id="rId3"/>
-          </a:graphicData>
-        </a:graphic>
-      </p:graphicFrame>
       <p:sp>
         <p:nvSpPr>
           <p:cNvPr id="8" name="Title 1"/>
@@ -7098,6 +6838,30 @@
           </a:p>
         </p:txBody>
       </p:sp>
+      <p:graphicFrame>
+        <p:nvGraphicFramePr>
+          <p:cNvPr id="7" name="Chart 6"/>
+          <p:cNvGraphicFramePr>
+            <a:graphicFrameLocks/>
+          </p:cNvGraphicFramePr>
+          <p:nvPr>
+            <p:extLst>
+              <p:ext uri="{D42A27DB-BD31-4B8C-83A1-F6EECF244321}">
+                <p14:modId xmlns:p14="http://schemas.microsoft.com/office/powerpoint/2010/main" val="3121603901"/>
+              </p:ext>
+            </p:extLst>
+          </p:nvPr>
+        </p:nvGraphicFramePr>
+        <p:xfrm>
+          <a:off x="430530" y="539115"/>
+          <a:ext cx="8282940" cy="4299585"/>
+        </p:xfrm>
+        <a:graphic>
+          <a:graphicData uri="http://schemas.openxmlformats.org/drawingml/2006/chart">
+            <c:chart xmlns:c="http://schemas.openxmlformats.org/drawingml/2006/chart" xmlns:r="http://schemas.openxmlformats.org/officeDocument/2006/relationships" r:id="rId3"/>
+          </a:graphicData>
+        </a:graphic>
+      </p:graphicFrame>
     </p:spTree>
     <p:extLst>
       <p:ext uri="{BB962C8B-B14F-4D97-AF65-F5344CB8AC3E}">

</xml_diff>